<commit_message>
updated presentation to include delete-insert
</commit_message>
<xml_diff>
--- a/Documents/pqGramRecommendations.pptx
+++ b/Documents/pqGramRecommendations.pptx
@@ -11,6 +11,9 @@
     <p:sldId id="259" r:id="rId5"/>
     <p:sldId id="260" r:id="rId6"/>
     <p:sldId id="261" r:id="rId7"/>
+    <p:sldId id="262" r:id="rId8"/>
+    <p:sldId id="263" r:id="rId9"/>
+    <p:sldId id="264" r:id="rId10"/>
   </p:sldIdLst>
   <p:sldSz cx="9144000" cy="6858000" type="screen4x3"/>
   <p:notesSz cx="6858000" cy="9144000"/>
@@ -293,7 +296,7 @@
           <a:p>
             <a:fld id="{38493CC0-04B8-493C-AC90-376291B935F9}" type="datetimeFigureOut">
               <a:rPr lang="en-US" smtClean="0"/>
-              <a:t>10/15/2012</a:t>
+              <a:t>10/19/2012</a:t>
             </a:fld>
             <a:endParaRPr lang="en-US"/>
           </a:p>
@@ -463,7 +466,7 @@
           <a:p>
             <a:fld id="{38493CC0-04B8-493C-AC90-376291B935F9}" type="datetimeFigureOut">
               <a:rPr lang="en-US" smtClean="0"/>
-              <a:t>10/15/2012</a:t>
+              <a:t>10/19/2012</a:t>
             </a:fld>
             <a:endParaRPr lang="en-US"/>
           </a:p>
@@ -643,7 +646,7 @@
           <a:p>
             <a:fld id="{38493CC0-04B8-493C-AC90-376291B935F9}" type="datetimeFigureOut">
               <a:rPr lang="en-US" smtClean="0"/>
-              <a:t>10/15/2012</a:t>
+              <a:t>10/19/2012</a:t>
             </a:fld>
             <a:endParaRPr lang="en-US"/>
           </a:p>
@@ -813,7 +816,7 @@
           <a:p>
             <a:fld id="{38493CC0-04B8-493C-AC90-376291B935F9}" type="datetimeFigureOut">
               <a:rPr lang="en-US" smtClean="0"/>
-              <a:t>10/15/2012</a:t>
+              <a:t>10/19/2012</a:t>
             </a:fld>
             <a:endParaRPr lang="en-US"/>
           </a:p>
@@ -1059,7 +1062,7 @@
           <a:p>
             <a:fld id="{38493CC0-04B8-493C-AC90-376291B935F9}" type="datetimeFigureOut">
               <a:rPr lang="en-US" smtClean="0"/>
-              <a:t>10/15/2012</a:t>
+              <a:t>10/19/2012</a:t>
             </a:fld>
             <a:endParaRPr lang="en-US"/>
           </a:p>
@@ -1347,7 +1350,7 @@
           <a:p>
             <a:fld id="{38493CC0-04B8-493C-AC90-376291B935F9}" type="datetimeFigureOut">
               <a:rPr lang="en-US" smtClean="0"/>
-              <a:t>10/15/2012</a:t>
+              <a:t>10/19/2012</a:t>
             </a:fld>
             <a:endParaRPr lang="en-US"/>
           </a:p>
@@ -1769,7 +1772,7 @@
           <a:p>
             <a:fld id="{38493CC0-04B8-493C-AC90-376291B935F9}" type="datetimeFigureOut">
               <a:rPr lang="en-US" smtClean="0"/>
-              <a:t>10/15/2012</a:t>
+              <a:t>10/19/2012</a:t>
             </a:fld>
             <a:endParaRPr lang="en-US"/>
           </a:p>
@@ -1887,7 +1890,7 @@
           <a:p>
             <a:fld id="{38493CC0-04B8-493C-AC90-376291B935F9}" type="datetimeFigureOut">
               <a:rPr lang="en-US" smtClean="0"/>
-              <a:t>10/15/2012</a:t>
+              <a:t>10/19/2012</a:t>
             </a:fld>
             <a:endParaRPr lang="en-US"/>
           </a:p>
@@ -1982,7 +1985,7 @@
           <a:p>
             <a:fld id="{38493CC0-04B8-493C-AC90-376291B935F9}" type="datetimeFigureOut">
               <a:rPr lang="en-US" smtClean="0"/>
-              <a:t>10/15/2012</a:t>
+              <a:t>10/19/2012</a:t>
             </a:fld>
             <a:endParaRPr lang="en-US"/>
           </a:p>
@@ -2259,7 +2262,7 @@
           <a:p>
             <a:fld id="{38493CC0-04B8-493C-AC90-376291B935F9}" type="datetimeFigureOut">
               <a:rPr lang="en-US" smtClean="0"/>
-              <a:t>10/15/2012</a:t>
+              <a:t>10/19/2012</a:t>
             </a:fld>
             <a:endParaRPr lang="en-US"/>
           </a:p>
@@ -2512,7 +2515,7 @@
           <a:p>
             <a:fld id="{38493CC0-04B8-493C-AC90-376291B935F9}" type="datetimeFigureOut">
               <a:rPr lang="en-US" smtClean="0"/>
-              <a:t>10/15/2012</a:t>
+              <a:t>10/19/2012</a:t>
             </a:fld>
             <a:endParaRPr lang="en-US"/>
           </a:p>
@@ -2725,7 +2728,7 @@
           <a:p>
             <a:fld id="{38493CC0-04B8-493C-AC90-376291B935F9}" type="datetimeFigureOut">
               <a:rPr lang="en-US" smtClean="0"/>
-              <a:t>10/15/2012</a:t>
+              <a:t>10/19/2012</a:t>
             </a:fld>
             <a:endParaRPr lang="en-US"/>
           </a:p>
@@ -9090,7 +9093,6 @@
               <a:rPr lang="en-US" dirty="0"/>
               <a:t>*</a:t>
             </a:r>
-            <a:endParaRPr lang="en-US" dirty="0"/>
           </a:p>
         </p:txBody>
       </p:sp>
@@ -9120,7 +9122,6 @@
               <a:rPr lang="en-US" dirty="0"/>
               <a:t>*</a:t>
             </a:r>
-            <a:endParaRPr lang="en-US" dirty="0"/>
           </a:p>
         </p:txBody>
       </p:sp>
@@ -9150,7 +9151,6 @@
               <a:rPr lang="en-US" dirty="0"/>
               <a:t>*</a:t>
             </a:r>
-            <a:endParaRPr lang="en-US" dirty="0"/>
           </a:p>
         </p:txBody>
       </p:sp>
@@ -9180,7 +9180,6 @@
               <a:rPr lang="en-US" dirty="0"/>
               <a:t>*</a:t>
             </a:r>
-            <a:endParaRPr lang="en-US" dirty="0"/>
           </a:p>
         </p:txBody>
       </p:sp>
@@ -9210,7 +9209,6 @@
               <a:rPr lang="en-US" dirty="0"/>
               <a:t>*</a:t>
             </a:r>
-            <a:endParaRPr lang="en-US" dirty="0"/>
           </a:p>
         </p:txBody>
       </p:sp>
@@ -9240,7 +9238,6 @@
               <a:rPr lang="en-US" dirty="0"/>
               <a:t>*</a:t>
             </a:r>
-            <a:endParaRPr lang="en-US" dirty="0"/>
           </a:p>
         </p:txBody>
       </p:sp>
@@ -9270,7 +9267,6 @@
               <a:rPr lang="en-US" dirty="0"/>
               <a:t>*</a:t>
             </a:r>
-            <a:endParaRPr lang="en-US" dirty="0"/>
           </a:p>
         </p:txBody>
       </p:sp>
@@ -9300,7 +9296,6 @@
               <a:rPr lang="en-US" dirty="0"/>
               <a:t>*</a:t>
             </a:r>
-            <a:endParaRPr lang="en-US" dirty="0"/>
           </a:p>
         </p:txBody>
       </p:sp>
@@ -9330,7 +9325,6 @@
               <a:rPr lang="en-US" dirty="0"/>
               <a:t>*</a:t>
             </a:r>
-            <a:endParaRPr lang="en-US" dirty="0"/>
           </a:p>
         </p:txBody>
       </p:sp>
@@ -9360,7 +9354,6 @@
               <a:rPr lang="en-US" dirty="0"/>
               <a:t>*</a:t>
             </a:r>
-            <a:endParaRPr lang="en-US" dirty="0"/>
           </a:p>
         </p:txBody>
       </p:sp>
@@ -9390,7 +9383,6 @@
               <a:rPr lang="en-US" dirty="0"/>
               <a:t>*</a:t>
             </a:r>
-            <a:endParaRPr lang="en-US" dirty="0"/>
           </a:p>
         </p:txBody>
       </p:sp>
@@ -9420,7 +9412,6 @@
               <a:rPr lang="en-US" dirty="0"/>
               <a:t>*</a:t>
             </a:r>
-            <a:endParaRPr lang="en-US" dirty="0"/>
           </a:p>
         </p:txBody>
       </p:sp>
@@ -9450,7 +9441,6 @@
               <a:rPr lang="en-US" dirty="0"/>
               <a:t>*</a:t>
             </a:r>
-            <a:endParaRPr lang="en-US" dirty="0"/>
           </a:p>
         </p:txBody>
       </p:sp>
@@ -9480,7 +9470,6 @@
               <a:rPr lang="en-US" dirty="0"/>
               <a:t>*</a:t>
             </a:r>
-            <a:endParaRPr lang="en-US" dirty="0"/>
           </a:p>
         </p:txBody>
       </p:sp>
@@ -9510,7 +9499,6 @@
               <a:rPr lang="en-US" dirty="0"/>
               <a:t>*</a:t>
             </a:r>
-            <a:endParaRPr lang="en-US" dirty="0"/>
           </a:p>
         </p:txBody>
       </p:sp>
@@ -10013,7 +10001,6 @@
               <a:rPr lang="en-US" dirty="0"/>
               <a:t>*</a:t>
             </a:r>
-            <a:endParaRPr lang="en-US" dirty="0"/>
           </a:p>
         </p:txBody>
       </p:sp>
@@ -10043,7 +10030,6 @@
               <a:rPr lang="en-US" dirty="0"/>
               <a:t>*</a:t>
             </a:r>
-            <a:endParaRPr lang="en-US" dirty="0"/>
           </a:p>
         </p:txBody>
       </p:sp>
@@ -10073,7 +10059,6 @@
               <a:rPr lang="en-US" dirty="0"/>
               <a:t>*</a:t>
             </a:r>
-            <a:endParaRPr lang="en-US" dirty="0"/>
           </a:p>
         </p:txBody>
       </p:sp>
@@ -10204,7 +10189,6 @@
               <a:rPr lang="en-US" dirty="0"/>
               <a:t>*</a:t>
             </a:r>
-            <a:endParaRPr lang="en-US" dirty="0"/>
           </a:p>
         </p:txBody>
       </p:sp>
@@ -10234,7 +10218,6 @@
               <a:rPr lang="en-US" dirty="0"/>
               <a:t>*</a:t>
             </a:r>
-            <a:endParaRPr lang="en-US" dirty="0"/>
           </a:p>
         </p:txBody>
       </p:sp>
@@ -10264,7 +10247,6 @@
               <a:rPr lang="en-US" dirty="0"/>
               <a:t>*</a:t>
             </a:r>
-            <a:endParaRPr lang="en-US" dirty="0"/>
           </a:p>
         </p:txBody>
       </p:sp>
@@ -10586,7 +10568,6 @@
               <a:rPr lang="en-US" dirty="0"/>
               <a:t>*</a:t>
             </a:r>
-            <a:endParaRPr lang="en-US" dirty="0"/>
           </a:p>
         </p:txBody>
       </p:sp>
@@ -10616,7 +10597,6 @@
               <a:rPr lang="en-US" dirty="0"/>
               <a:t>*</a:t>
             </a:r>
-            <a:endParaRPr lang="en-US" dirty="0"/>
           </a:p>
         </p:txBody>
       </p:sp>
@@ -36774,6 +36754,3377 @@
 </p:sld>
 </file>
 
+<file path=ppt/slides/slide7.xml><?xml version="1.0" encoding="utf-8"?>
+<p:sld xmlns:a="http://schemas.openxmlformats.org/drawingml/2006/main" xmlns:r="http://schemas.openxmlformats.org/officeDocument/2006/relationships" xmlns:p="http://schemas.openxmlformats.org/presentationml/2006/main">
+  <p:cSld>
+    <p:spTree>
+      <p:nvGrpSpPr>
+        <p:cNvPr id="1" name=""/>
+        <p:cNvGrpSpPr/>
+        <p:nvPr/>
+      </p:nvGrpSpPr>
+      <p:grpSpPr>
+        <a:xfrm>
+          <a:off x="0" y="0"/>
+          <a:ext cx="0" cy="0"/>
+          <a:chOff x="0" y="0"/>
+          <a:chExt cx="0" cy="0"/>
+        </a:xfrm>
+      </p:grpSpPr>
+      <p:sp>
+        <p:nvSpPr>
+          <p:cNvPr id="4" name="TextBox 3"/>
+          <p:cNvSpPr txBox="1"/>
+          <p:nvPr/>
+        </p:nvSpPr>
+        <p:spPr>
+          <a:xfrm>
+            <a:off x="3886200" y="381000"/>
+            <a:ext cx="381000" cy="381000"/>
+          </a:xfrm>
+          <a:prstGeom prst="rect">
+            <a:avLst/>
+          </a:prstGeom>
+          <a:noFill/>
+        </p:spPr>
+        <p:txBody>
+          <a:bodyPr wrap="square" rtlCol="0">
+            <a:spAutoFit/>
+          </a:bodyPr>
+          <a:lstStyle/>
+          <a:p>
+            <a:r>
+              <a:rPr lang="en-US" dirty="0" smtClean="0">
+                <a:solidFill>
+                  <a:srgbClr val="7030A0"/>
+                </a:solidFill>
+              </a:rPr>
+              <a:t>a</a:t>
+            </a:r>
+            <a:endParaRPr lang="en-US" dirty="0">
+              <a:solidFill>
+                <a:srgbClr val="7030A0"/>
+              </a:solidFill>
+            </a:endParaRPr>
+          </a:p>
+        </p:txBody>
+      </p:sp>
+      <p:cxnSp>
+        <p:nvCxnSpPr>
+          <p:cNvPr id="5" name="Straight Arrow Connector 4"/>
+          <p:cNvCxnSpPr/>
+          <p:nvPr/>
+        </p:nvCxnSpPr>
+        <p:spPr>
+          <a:xfrm flipH="1">
+            <a:off x="3581400" y="685800"/>
+            <a:ext cx="304800" cy="304800"/>
+          </a:xfrm>
+          <a:prstGeom prst="straightConnector1">
+            <a:avLst/>
+          </a:prstGeom>
+          <a:ln>
+            <a:solidFill>
+              <a:srgbClr val="7030A0"/>
+            </a:solidFill>
+            <a:tailEnd type="arrow"/>
+          </a:ln>
+        </p:spPr>
+        <p:style>
+          <a:lnRef idx="1">
+            <a:schemeClr val="accent1"/>
+          </a:lnRef>
+          <a:fillRef idx="0">
+            <a:schemeClr val="accent1"/>
+          </a:fillRef>
+          <a:effectRef idx="0">
+            <a:schemeClr val="accent1"/>
+          </a:effectRef>
+          <a:fontRef idx="minor">
+            <a:schemeClr val="tx1"/>
+          </a:fontRef>
+        </p:style>
+      </p:cxnSp>
+      <p:sp>
+        <p:nvSpPr>
+          <p:cNvPr id="6" name="TextBox 5"/>
+          <p:cNvSpPr txBox="1"/>
+          <p:nvPr/>
+        </p:nvSpPr>
+        <p:spPr>
+          <a:xfrm>
+            <a:off x="3311979" y="1036864"/>
+            <a:ext cx="381000" cy="381000"/>
+          </a:xfrm>
+          <a:prstGeom prst="rect">
+            <a:avLst/>
+          </a:prstGeom>
+          <a:noFill/>
+        </p:spPr>
+        <p:txBody>
+          <a:bodyPr wrap="square" rtlCol="0">
+            <a:spAutoFit/>
+          </a:bodyPr>
+          <a:lstStyle/>
+          <a:p>
+            <a:r>
+              <a:rPr lang="en-US" dirty="0">
+                <a:solidFill>
+                  <a:srgbClr val="7030A0"/>
+                </a:solidFill>
+              </a:rPr>
+              <a:t>a</a:t>
+            </a:r>
+          </a:p>
+        </p:txBody>
+      </p:sp>
+      <p:sp>
+        <p:nvSpPr>
+          <p:cNvPr id="7" name="TextBox 6"/>
+          <p:cNvSpPr txBox="1"/>
+          <p:nvPr/>
+        </p:nvSpPr>
+        <p:spPr>
+          <a:xfrm>
+            <a:off x="3886200" y="1036864"/>
+            <a:ext cx="381000" cy="381000"/>
+          </a:xfrm>
+          <a:prstGeom prst="rect">
+            <a:avLst/>
+          </a:prstGeom>
+          <a:noFill/>
+        </p:spPr>
+        <p:txBody>
+          <a:bodyPr wrap="square" rtlCol="0">
+            <a:spAutoFit/>
+          </a:bodyPr>
+          <a:lstStyle/>
+          <a:p>
+            <a:r>
+              <a:rPr lang="en-US" dirty="0" smtClean="0">
+                <a:solidFill>
+                  <a:srgbClr val="7030A0"/>
+                </a:solidFill>
+              </a:rPr>
+              <a:t>b</a:t>
+            </a:r>
+            <a:endParaRPr lang="en-US" dirty="0">
+              <a:solidFill>
+                <a:srgbClr val="7030A0"/>
+              </a:solidFill>
+            </a:endParaRPr>
+          </a:p>
+        </p:txBody>
+      </p:sp>
+      <p:cxnSp>
+        <p:nvCxnSpPr>
+          <p:cNvPr id="8" name="Straight Arrow Connector 7"/>
+          <p:cNvCxnSpPr/>
+          <p:nvPr/>
+        </p:nvCxnSpPr>
+        <p:spPr>
+          <a:xfrm>
+            <a:off x="4038600" y="702129"/>
+            <a:ext cx="0" cy="288471"/>
+          </a:xfrm>
+          <a:prstGeom prst="straightConnector1">
+            <a:avLst/>
+          </a:prstGeom>
+          <a:ln>
+            <a:solidFill>
+              <a:srgbClr val="7030A0"/>
+            </a:solidFill>
+            <a:tailEnd type="arrow"/>
+          </a:ln>
+        </p:spPr>
+        <p:style>
+          <a:lnRef idx="1">
+            <a:schemeClr val="accent1"/>
+          </a:lnRef>
+          <a:fillRef idx="0">
+            <a:schemeClr val="accent1"/>
+          </a:fillRef>
+          <a:effectRef idx="0">
+            <a:schemeClr val="accent1"/>
+          </a:effectRef>
+          <a:fontRef idx="minor">
+            <a:schemeClr val="tx1"/>
+          </a:fontRef>
+        </p:style>
+      </p:cxnSp>
+      <p:cxnSp>
+        <p:nvCxnSpPr>
+          <p:cNvPr id="9" name="Straight Arrow Connector 8"/>
+          <p:cNvCxnSpPr/>
+          <p:nvPr/>
+        </p:nvCxnSpPr>
+        <p:spPr>
+          <a:xfrm flipH="1">
+            <a:off x="3004457" y="1412421"/>
+            <a:ext cx="304800" cy="304800"/>
+          </a:xfrm>
+          <a:prstGeom prst="straightConnector1">
+            <a:avLst/>
+          </a:prstGeom>
+          <a:ln>
+            <a:solidFill>
+              <a:srgbClr val="7030A0"/>
+            </a:solidFill>
+            <a:tailEnd type="arrow"/>
+          </a:ln>
+        </p:spPr>
+        <p:style>
+          <a:lnRef idx="1">
+            <a:schemeClr val="accent1"/>
+          </a:lnRef>
+          <a:fillRef idx="0">
+            <a:schemeClr val="accent1"/>
+          </a:fillRef>
+          <a:effectRef idx="0">
+            <a:schemeClr val="accent1"/>
+          </a:effectRef>
+          <a:fontRef idx="minor">
+            <a:schemeClr val="tx1"/>
+          </a:fontRef>
+        </p:style>
+      </p:cxnSp>
+      <p:sp>
+        <p:nvSpPr>
+          <p:cNvPr id="10" name="TextBox 9"/>
+          <p:cNvSpPr txBox="1"/>
+          <p:nvPr/>
+        </p:nvSpPr>
+        <p:spPr>
+          <a:xfrm>
+            <a:off x="2735036" y="1763485"/>
+            <a:ext cx="381000" cy="381000"/>
+          </a:xfrm>
+          <a:prstGeom prst="rect">
+            <a:avLst/>
+          </a:prstGeom>
+          <a:noFill/>
+        </p:spPr>
+        <p:txBody>
+          <a:bodyPr wrap="square" rtlCol="0">
+            <a:spAutoFit/>
+          </a:bodyPr>
+          <a:lstStyle/>
+          <a:p>
+            <a:r>
+              <a:rPr lang="en-US" dirty="0" smtClean="0">
+                <a:solidFill>
+                  <a:srgbClr val="7030A0"/>
+                </a:solidFill>
+              </a:rPr>
+              <a:t>e</a:t>
+            </a:r>
+            <a:endParaRPr lang="en-US" dirty="0">
+              <a:solidFill>
+                <a:srgbClr val="7030A0"/>
+              </a:solidFill>
+            </a:endParaRPr>
+          </a:p>
+        </p:txBody>
+      </p:sp>
+      <p:sp>
+        <p:nvSpPr>
+          <p:cNvPr id="11" name="TextBox 10"/>
+          <p:cNvSpPr txBox="1"/>
+          <p:nvPr/>
+        </p:nvSpPr>
+        <p:spPr>
+          <a:xfrm>
+            <a:off x="3309257" y="1763485"/>
+            <a:ext cx="381000" cy="381000"/>
+          </a:xfrm>
+          <a:prstGeom prst="rect">
+            <a:avLst/>
+          </a:prstGeom>
+          <a:noFill/>
+        </p:spPr>
+        <p:txBody>
+          <a:bodyPr wrap="square" rtlCol="0">
+            <a:spAutoFit/>
+          </a:bodyPr>
+          <a:lstStyle/>
+          <a:p>
+            <a:r>
+              <a:rPr lang="en-US" dirty="0" smtClean="0">
+                <a:solidFill>
+                  <a:srgbClr val="7030A0"/>
+                </a:solidFill>
+              </a:rPr>
+              <a:t>b</a:t>
+            </a:r>
+            <a:endParaRPr lang="en-US" dirty="0">
+              <a:solidFill>
+                <a:srgbClr val="7030A0"/>
+              </a:solidFill>
+            </a:endParaRPr>
+          </a:p>
+        </p:txBody>
+      </p:sp>
+      <p:cxnSp>
+        <p:nvCxnSpPr>
+          <p:cNvPr id="12" name="Straight Arrow Connector 11"/>
+          <p:cNvCxnSpPr/>
+          <p:nvPr/>
+        </p:nvCxnSpPr>
+        <p:spPr>
+          <a:xfrm>
+            <a:off x="3461657" y="1428750"/>
+            <a:ext cx="0" cy="288471"/>
+          </a:xfrm>
+          <a:prstGeom prst="straightConnector1">
+            <a:avLst/>
+          </a:prstGeom>
+          <a:ln>
+            <a:solidFill>
+              <a:srgbClr val="7030A0"/>
+            </a:solidFill>
+            <a:tailEnd type="arrow"/>
+          </a:ln>
+        </p:spPr>
+        <p:style>
+          <a:lnRef idx="1">
+            <a:schemeClr val="accent1"/>
+          </a:lnRef>
+          <a:fillRef idx="0">
+            <a:schemeClr val="accent1"/>
+          </a:fillRef>
+          <a:effectRef idx="0">
+            <a:schemeClr val="accent1"/>
+          </a:effectRef>
+          <a:fontRef idx="minor">
+            <a:schemeClr val="tx1"/>
+          </a:fontRef>
+        </p:style>
+      </p:cxnSp>
+      <p:sp>
+        <p:nvSpPr>
+          <p:cNvPr id="13" name="TextBox 12"/>
+          <p:cNvSpPr txBox="1"/>
+          <p:nvPr/>
+        </p:nvSpPr>
+        <p:spPr>
+          <a:xfrm>
+            <a:off x="351065" y="514171"/>
+            <a:ext cx="2590800" cy="1200329"/>
+          </a:xfrm>
+          <a:prstGeom prst="rect">
+            <a:avLst/>
+          </a:prstGeom>
+          <a:noFill/>
+        </p:spPr>
+        <p:txBody>
+          <a:bodyPr wrap="square" rtlCol="0">
+            <a:spAutoFit/>
+          </a:bodyPr>
+          <a:lstStyle/>
+          <a:p>
+            <a:r>
+              <a:rPr lang="en-US" dirty="0" smtClean="0">
+                <a:solidFill>
+                  <a:srgbClr val="7030A0"/>
+                </a:solidFill>
+              </a:rPr>
+              <a:t>We have built up the common </a:t>
+            </a:r>
+            <a:r>
+              <a:rPr lang="en-US" dirty="0" err="1" smtClean="0">
+                <a:solidFill>
+                  <a:srgbClr val="7030A0"/>
+                </a:solidFill>
+              </a:rPr>
+              <a:t>subtrees</a:t>
+            </a:r>
+            <a:r>
+              <a:rPr lang="en-US" dirty="0" smtClean="0">
+                <a:solidFill>
+                  <a:srgbClr val="7030A0"/>
+                </a:solidFill>
+              </a:rPr>
+              <a:t> (in this case, just one) as previously described:</a:t>
+            </a:r>
+            <a:endParaRPr lang="en-US" dirty="0">
+              <a:solidFill>
+                <a:srgbClr val="7030A0"/>
+              </a:solidFill>
+            </a:endParaRPr>
+          </a:p>
+        </p:txBody>
+      </p:sp>
+      <p:graphicFrame>
+        <p:nvGraphicFramePr>
+          <p:cNvPr id="14" name="Table 13"/>
+          <p:cNvGraphicFramePr>
+            <a:graphicFrameLocks noGrp="1"/>
+          </p:cNvGraphicFramePr>
+          <p:nvPr>
+            <p:extLst>
+              <p:ext uri="{D42A27DB-BD31-4B8C-83A1-F6EECF244321}">
+                <p14:modId xmlns:p14="http://schemas.microsoft.com/office/powerpoint/2010/main" val="819311417"/>
+              </p:ext>
+            </p:extLst>
+          </p:nvPr>
+        </p:nvGraphicFramePr>
+        <p:xfrm>
+          <a:off x="3352800" y="3505200"/>
+          <a:ext cx="1543050" cy="1266948"/>
+        </p:xfrm>
+        <a:graphic>
+          <a:graphicData uri="http://schemas.openxmlformats.org/drawingml/2006/table">
+            <a:tbl>
+              <a:tblPr firstRow="1" bandRow="1">
+                <a:tableStyleId>{2D5ABB26-0587-4C30-8999-92F81FD0307C}</a:tableStyleId>
+              </a:tblPr>
+              <a:tblGrid>
+                <a:gridCol w="323850"/>
+                <a:gridCol w="304800"/>
+                <a:gridCol w="304800"/>
+                <a:gridCol w="304800"/>
+                <a:gridCol w="304800"/>
+              </a:tblGrid>
+              <a:tr h="294485">
+                <a:tc>
+                  <a:txBody>
+                    <a:bodyPr/>
+                    <a:lstStyle/>
+                    <a:p>
+                      <a:pPr algn="ctr"/>
+                      <a:r>
+                        <a:rPr lang="en-US" sz="1400" dirty="0" smtClean="0">
+                          <a:solidFill>
+                            <a:schemeClr val="bg1"/>
+                          </a:solidFill>
+                        </a:rPr>
+                        <a:t>*</a:t>
+                      </a:r>
+                      <a:endParaRPr lang="en-US" sz="1400" dirty="0">
+                        <a:solidFill>
+                          <a:schemeClr val="bg1"/>
+                        </a:solidFill>
+                      </a:endParaRPr>
+                    </a:p>
+                  </a:txBody>
+                  <a:tcPr>
+                    <a:lnT w="12700" cap="flat" cmpd="sng" algn="ctr">
+                      <a:solidFill>
+                        <a:schemeClr val="tx1"/>
+                      </a:solidFill>
+                      <a:prstDash val="solid"/>
+                      <a:round/>
+                      <a:headEnd type="none" w="med" len="med"/>
+                      <a:tailEnd type="none" w="med" len="med"/>
+                    </a:lnT>
+                    <a:lnB w="12700" cap="flat" cmpd="sng" algn="ctr">
+                      <a:solidFill>
+                        <a:schemeClr val="tx1"/>
+                      </a:solidFill>
+                      <a:prstDash val="solid"/>
+                      <a:round/>
+                      <a:headEnd type="none" w="med" len="med"/>
+                      <a:tailEnd type="none" w="med" len="med"/>
+                    </a:lnB>
+                    <a:solidFill>
+                      <a:schemeClr val="accent2">
+                        <a:lumMod val="75000"/>
+                      </a:schemeClr>
+                    </a:solidFill>
+                  </a:tcPr>
+                </a:tc>
+                <a:tc>
+                  <a:txBody>
+                    <a:bodyPr/>
+                    <a:lstStyle/>
+                    <a:p>
+                      <a:pPr algn="ctr"/>
+                      <a:r>
+                        <a:rPr lang="en-US" sz="1400" dirty="0" smtClean="0">
+                          <a:solidFill>
+                            <a:schemeClr val="bg1"/>
+                          </a:solidFill>
+                        </a:rPr>
+                        <a:t>a</a:t>
+                      </a:r>
+                      <a:endParaRPr lang="en-US" sz="1400" dirty="0">
+                        <a:solidFill>
+                          <a:schemeClr val="bg1"/>
+                        </a:solidFill>
+                      </a:endParaRPr>
+                    </a:p>
+                  </a:txBody>
+                  <a:tcPr>
+                    <a:lnT w="12700" cap="flat" cmpd="sng" algn="ctr">
+                      <a:solidFill>
+                        <a:schemeClr val="tx1"/>
+                      </a:solidFill>
+                      <a:prstDash val="solid"/>
+                      <a:round/>
+                      <a:headEnd type="none" w="med" len="med"/>
+                      <a:tailEnd type="none" w="med" len="med"/>
+                    </a:lnT>
+                    <a:lnB w="12700" cap="flat" cmpd="sng" algn="ctr">
+                      <a:solidFill>
+                        <a:schemeClr val="tx1"/>
+                      </a:solidFill>
+                      <a:prstDash val="solid"/>
+                      <a:round/>
+                      <a:headEnd type="none" w="med" len="med"/>
+                      <a:tailEnd type="none" w="med" len="med"/>
+                    </a:lnB>
+                    <a:solidFill>
+                      <a:schemeClr val="accent2">
+                        <a:lumMod val="75000"/>
+                      </a:schemeClr>
+                    </a:solidFill>
+                  </a:tcPr>
+                </a:tc>
+                <a:tc>
+                  <a:txBody>
+                    <a:bodyPr/>
+                    <a:lstStyle/>
+                    <a:p>
+                      <a:pPr algn="ctr"/>
+                      <a:r>
+                        <a:rPr lang="en-US" sz="1400" dirty="0" smtClean="0">
+                          <a:solidFill>
+                            <a:schemeClr val="bg1"/>
+                          </a:solidFill>
+                        </a:rPr>
+                        <a:t>a</a:t>
+                      </a:r>
+                      <a:endParaRPr lang="en-US" sz="1400" dirty="0">
+                        <a:solidFill>
+                          <a:schemeClr val="bg1"/>
+                        </a:solidFill>
+                      </a:endParaRPr>
+                    </a:p>
+                  </a:txBody>
+                  <a:tcPr>
+                    <a:lnT w="12700" cap="flat" cmpd="sng" algn="ctr">
+                      <a:solidFill>
+                        <a:schemeClr val="tx1"/>
+                      </a:solidFill>
+                      <a:prstDash val="solid"/>
+                      <a:round/>
+                      <a:headEnd type="none" w="med" len="med"/>
+                      <a:tailEnd type="none" w="med" len="med"/>
+                    </a:lnT>
+                    <a:lnB w="12700" cap="flat" cmpd="sng" algn="ctr">
+                      <a:solidFill>
+                        <a:schemeClr val="tx1"/>
+                      </a:solidFill>
+                      <a:prstDash val="solid"/>
+                      <a:round/>
+                      <a:headEnd type="none" w="med" len="med"/>
+                      <a:tailEnd type="none" w="med" len="med"/>
+                    </a:lnB>
+                    <a:solidFill>
+                      <a:schemeClr val="accent2">
+                        <a:lumMod val="75000"/>
+                      </a:schemeClr>
+                    </a:solidFill>
+                  </a:tcPr>
+                </a:tc>
+                <a:tc>
+                  <a:txBody>
+                    <a:bodyPr/>
+                    <a:lstStyle/>
+                    <a:p>
+                      <a:pPr algn="ctr"/>
+                      <a:r>
+                        <a:rPr lang="en-US" sz="1400" dirty="0" smtClean="0">
+                          <a:solidFill>
+                            <a:schemeClr val="bg1"/>
+                          </a:solidFill>
+                        </a:rPr>
+                        <a:t>b</a:t>
+                      </a:r>
+                      <a:endParaRPr lang="en-US" sz="1400" dirty="0">
+                        <a:solidFill>
+                          <a:schemeClr val="bg1"/>
+                        </a:solidFill>
+                      </a:endParaRPr>
+                    </a:p>
+                  </a:txBody>
+                  <a:tcPr>
+                    <a:lnT w="12700" cap="flat" cmpd="sng" algn="ctr">
+                      <a:solidFill>
+                        <a:schemeClr val="tx1"/>
+                      </a:solidFill>
+                      <a:prstDash val="solid"/>
+                      <a:round/>
+                      <a:headEnd type="none" w="med" len="med"/>
+                      <a:tailEnd type="none" w="med" len="med"/>
+                    </a:lnT>
+                    <a:lnB w="12700" cap="flat" cmpd="sng" algn="ctr">
+                      <a:solidFill>
+                        <a:schemeClr val="tx1"/>
+                      </a:solidFill>
+                      <a:prstDash val="solid"/>
+                      <a:round/>
+                      <a:headEnd type="none" w="med" len="med"/>
+                      <a:tailEnd type="none" w="med" len="med"/>
+                    </a:lnB>
+                    <a:solidFill>
+                      <a:schemeClr val="accent2">
+                        <a:lumMod val="75000"/>
+                      </a:schemeClr>
+                    </a:solidFill>
+                  </a:tcPr>
+                </a:tc>
+                <a:tc>
+                  <a:txBody>
+                    <a:bodyPr/>
+                    <a:lstStyle/>
+                    <a:p>
+                      <a:pPr algn="ctr"/>
+                      <a:r>
+                        <a:rPr lang="en-US" sz="1400" dirty="0" smtClean="0">
+                          <a:solidFill>
+                            <a:schemeClr val="bg1"/>
+                          </a:solidFill>
+                        </a:rPr>
+                        <a:t>c</a:t>
+                      </a:r>
+                      <a:endParaRPr lang="en-US" sz="1400" dirty="0">
+                        <a:solidFill>
+                          <a:schemeClr val="bg1"/>
+                        </a:solidFill>
+                      </a:endParaRPr>
+                    </a:p>
+                  </a:txBody>
+                  <a:tcPr>
+                    <a:lnT w="12700" cap="flat" cmpd="sng" algn="ctr">
+                      <a:solidFill>
+                        <a:schemeClr val="tx1"/>
+                      </a:solidFill>
+                      <a:prstDash val="solid"/>
+                      <a:round/>
+                      <a:headEnd type="none" w="med" len="med"/>
+                      <a:tailEnd type="none" w="med" len="med"/>
+                    </a:lnT>
+                    <a:lnB w="12700" cap="flat" cmpd="sng" algn="ctr">
+                      <a:solidFill>
+                        <a:schemeClr val="tx1"/>
+                      </a:solidFill>
+                      <a:prstDash val="solid"/>
+                      <a:round/>
+                      <a:headEnd type="none" w="med" len="med"/>
+                      <a:tailEnd type="none" w="med" len="med"/>
+                    </a:lnB>
+                    <a:solidFill>
+                      <a:schemeClr val="accent2">
+                        <a:lumMod val="75000"/>
+                      </a:schemeClr>
+                    </a:solidFill>
+                  </a:tcPr>
+                </a:tc>
+              </a:tr>
+              <a:tr h="294485">
+                <a:tc>
+                  <a:txBody>
+                    <a:bodyPr/>
+                    <a:lstStyle/>
+                    <a:p>
+                      <a:pPr algn="ctr"/>
+                      <a:r>
+                        <a:rPr lang="en-US" sz="1400" dirty="0" smtClean="0">
+                          <a:solidFill>
+                            <a:schemeClr val="bg1"/>
+                          </a:solidFill>
+                        </a:rPr>
+                        <a:t>a</a:t>
+                      </a:r>
+                      <a:endParaRPr lang="en-US" sz="1400" dirty="0">
+                        <a:solidFill>
+                          <a:schemeClr val="bg1"/>
+                        </a:solidFill>
+                      </a:endParaRPr>
+                    </a:p>
+                  </a:txBody>
+                  <a:tcPr>
+                    <a:lnT w="12700" cap="flat" cmpd="sng" algn="ctr">
+                      <a:solidFill>
+                        <a:schemeClr val="tx1"/>
+                      </a:solidFill>
+                      <a:prstDash val="solid"/>
+                      <a:round/>
+                      <a:headEnd type="none" w="med" len="med"/>
+                      <a:tailEnd type="none" w="med" len="med"/>
+                    </a:lnT>
+                    <a:lnB w="12700" cap="flat" cmpd="sng" algn="ctr">
+                      <a:solidFill>
+                        <a:schemeClr val="tx1"/>
+                      </a:solidFill>
+                      <a:prstDash val="solid"/>
+                      <a:round/>
+                      <a:headEnd type="none" w="med" len="med"/>
+                      <a:tailEnd type="none" w="med" len="med"/>
+                    </a:lnB>
+                    <a:solidFill>
+                      <a:schemeClr val="accent2">
+                        <a:lumMod val="75000"/>
+                      </a:schemeClr>
+                    </a:solidFill>
+                  </a:tcPr>
+                </a:tc>
+                <a:tc>
+                  <a:txBody>
+                    <a:bodyPr/>
+                    <a:lstStyle/>
+                    <a:p>
+                      <a:pPr algn="ctr"/>
+                      <a:r>
+                        <a:rPr lang="en-US" sz="1400" dirty="0" smtClean="0">
+                          <a:solidFill>
+                            <a:schemeClr val="bg1"/>
+                          </a:solidFill>
+                        </a:rPr>
+                        <a:t>c</a:t>
+                      </a:r>
+                      <a:endParaRPr lang="en-US" sz="1400" dirty="0">
+                        <a:solidFill>
+                          <a:schemeClr val="bg1"/>
+                        </a:solidFill>
+                      </a:endParaRPr>
+                    </a:p>
+                  </a:txBody>
+                  <a:tcPr>
+                    <a:lnT w="12700" cap="flat" cmpd="sng" algn="ctr">
+                      <a:solidFill>
+                        <a:schemeClr val="tx1"/>
+                      </a:solidFill>
+                      <a:prstDash val="solid"/>
+                      <a:round/>
+                      <a:headEnd type="none" w="med" len="med"/>
+                      <a:tailEnd type="none" w="med" len="med"/>
+                    </a:lnT>
+                    <a:lnB w="12700" cap="flat" cmpd="sng" algn="ctr">
+                      <a:solidFill>
+                        <a:schemeClr val="tx1"/>
+                      </a:solidFill>
+                      <a:prstDash val="solid"/>
+                      <a:round/>
+                      <a:headEnd type="none" w="med" len="med"/>
+                      <a:tailEnd type="none" w="med" len="med"/>
+                    </a:lnB>
+                    <a:solidFill>
+                      <a:schemeClr val="accent2">
+                        <a:lumMod val="75000"/>
+                      </a:schemeClr>
+                    </a:solidFill>
+                  </a:tcPr>
+                </a:tc>
+                <a:tc>
+                  <a:txBody>
+                    <a:bodyPr/>
+                    <a:lstStyle/>
+                    <a:p>
+                      <a:pPr algn="ctr"/>
+                      <a:r>
+                        <a:rPr lang="en-US" sz="1400" dirty="0" smtClean="0">
+                          <a:solidFill>
+                            <a:schemeClr val="bg1"/>
+                          </a:solidFill>
+                        </a:rPr>
+                        <a:t>*</a:t>
+                      </a:r>
+                      <a:endParaRPr lang="en-US" sz="1400" dirty="0">
+                        <a:solidFill>
+                          <a:schemeClr val="bg1"/>
+                        </a:solidFill>
+                      </a:endParaRPr>
+                    </a:p>
+                  </a:txBody>
+                  <a:tcPr>
+                    <a:lnT w="12700" cap="flat" cmpd="sng" algn="ctr">
+                      <a:solidFill>
+                        <a:schemeClr val="tx1"/>
+                      </a:solidFill>
+                      <a:prstDash val="solid"/>
+                      <a:round/>
+                      <a:headEnd type="none" w="med" len="med"/>
+                      <a:tailEnd type="none" w="med" len="med"/>
+                    </a:lnT>
+                    <a:lnB w="12700" cap="flat" cmpd="sng" algn="ctr">
+                      <a:solidFill>
+                        <a:schemeClr val="tx1"/>
+                      </a:solidFill>
+                      <a:prstDash val="solid"/>
+                      <a:round/>
+                      <a:headEnd type="none" w="med" len="med"/>
+                      <a:tailEnd type="none" w="med" len="med"/>
+                    </a:lnB>
+                    <a:solidFill>
+                      <a:schemeClr val="accent2">
+                        <a:lumMod val="75000"/>
+                      </a:schemeClr>
+                    </a:solidFill>
+                  </a:tcPr>
+                </a:tc>
+                <a:tc>
+                  <a:txBody>
+                    <a:bodyPr/>
+                    <a:lstStyle/>
+                    <a:p>
+                      <a:pPr algn="ctr"/>
+                      <a:r>
+                        <a:rPr lang="en-US" sz="1400" dirty="0" smtClean="0">
+                          <a:solidFill>
+                            <a:schemeClr val="bg1"/>
+                          </a:solidFill>
+                        </a:rPr>
+                        <a:t>*</a:t>
+                      </a:r>
+                      <a:endParaRPr lang="en-US" sz="1400" dirty="0">
+                        <a:solidFill>
+                          <a:schemeClr val="bg1"/>
+                        </a:solidFill>
+                      </a:endParaRPr>
+                    </a:p>
+                  </a:txBody>
+                  <a:tcPr>
+                    <a:lnT w="12700" cap="flat" cmpd="sng" algn="ctr">
+                      <a:solidFill>
+                        <a:schemeClr val="tx1"/>
+                      </a:solidFill>
+                      <a:prstDash val="solid"/>
+                      <a:round/>
+                      <a:headEnd type="none" w="med" len="med"/>
+                      <a:tailEnd type="none" w="med" len="med"/>
+                    </a:lnT>
+                    <a:lnB w="12700" cap="flat" cmpd="sng" algn="ctr">
+                      <a:solidFill>
+                        <a:schemeClr val="tx1"/>
+                      </a:solidFill>
+                      <a:prstDash val="solid"/>
+                      <a:round/>
+                      <a:headEnd type="none" w="med" len="med"/>
+                      <a:tailEnd type="none" w="med" len="med"/>
+                    </a:lnB>
+                    <a:solidFill>
+                      <a:schemeClr val="accent2">
+                        <a:lumMod val="75000"/>
+                      </a:schemeClr>
+                    </a:solidFill>
+                  </a:tcPr>
+                </a:tc>
+                <a:tc>
+                  <a:txBody>
+                    <a:bodyPr/>
+                    <a:lstStyle/>
+                    <a:p>
+                      <a:pPr algn="ctr"/>
+                      <a:r>
+                        <a:rPr lang="en-US" sz="1400" dirty="0" smtClean="0">
+                          <a:solidFill>
+                            <a:schemeClr val="bg1"/>
+                          </a:solidFill>
+                        </a:rPr>
+                        <a:t>*</a:t>
+                      </a:r>
+                      <a:endParaRPr lang="en-US" sz="1400" dirty="0">
+                        <a:solidFill>
+                          <a:schemeClr val="bg1"/>
+                        </a:solidFill>
+                      </a:endParaRPr>
+                    </a:p>
+                  </a:txBody>
+                  <a:tcPr>
+                    <a:lnT w="12700" cap="flat" cmpd="sng" algn="ctr">
+                      <a:solidFill>
+                        <a:schemeClr val="tx1"/>
+                      </a:solidFill>
+                      <a:prstDash val="solid"/>
+                      <a:round/>
+                      <a:headEnd type="none" w="med" len="med"/>
+                      <a:tailEnd type="none" w="med" len="med"/>
+                    </a:lnT>
+                    <a:lnB w="12700" cap="flat" cmpd="sng" algn="ctr">
+                      <a:solidFill>
+                        <a:schemeClr val="tx1"/>
+                      </a:solidFill>
+                      <a:prstDash val="solid"/>
+                      <a:round/>
+                      <a:headEnd type="none" w="med" len="med"/>
+                      <a:tailEnd type="none" w="med" len="med"/>
+                    </a:lnB>
+                    <a:solidFill>
+                      <a:schemeClr val="accent2">
+                        <a:lumMod val="75000"/>
+                      </a:schemeClr>
+                    </a:solidFill>
+                  </a:tcPr>
+                </a:tc>
+              </a:tr>
+              <a:tr h="294485">
+                <a:tc>
+                  <a:txBody>
+                    <a:bodyPr/>
+                    <a:lstStyle/>
+                    <a:p>
+                      <a:pPr algn="ctr"/>
+                      <a:r>
+                        <a:rPr lang="en-US" sz="1400" dirty="0" smtClean="0">
+                          <a:solidFill>
+                            <a:schemeClr val="bg1"/>
+                          </a:solidFill>
+                        </a:rPr>
+                        <a:t>*</a:t>
+                      </a:r>
+                      <a:endParaRPr lang="en-US" sz="1400" dirty="0">
+                        <a:solidFill>
+                          <a:schemeClr val="bg1"/>
+                        </a:solidFill>
+                      </a:endParaRPr>
+                    </a:p>
+                  </a:txBody>
+                  <a:tcPr>
+                    <a:lnT w="12700" cap="flat" cmpd="sng" algn="ctr">
+                      <a:solidFill>
+                        <a:schemeClr val="tx1"/>
+                      </a:solidFill>
+                      <a:prstDash val="solid"/>
+                      <a:round/>
+                      <a:headEnd type="none" w="med" len="med"/>
+                      <a:tailEnd type="none" w="med" len="med"/>
+                    </a:lnT>
+                    <a:lnB w="12700" cap="flat" cmpd="sng" algn="ctr">
+                      <a:solidFill>
+                        <a:schemeClr val="tx1"/>
+                      </a:solidFill>
+                      <a:prstDash val="solid"/>
+                      <a:round/>
+                      <a:headEnd type="none" w="med" len="med"/>
+                      <a:tailEnd type="none" w="med" len="med"/>
+                    </a:lnB>
+                    <a:solidFill>
+                      <a:schemeClr val="accent2">
+                        <a:lumMod val="75000"/>
+                      </a:schemeClr>
+                    </a:solidFill>
+                  </a:tcPr>
+                </a:tc>
+                <a:tc>
+                  <a:txBody>
+                    <a:bodyPr/>
+                    <a:lstStyle/>
+                    <a:p>
+                      <a:pPr algn="ctr"/>
+                      <a:r>
+                        <a:rPr lang="en-US" sz="1400" dirty="0" smtClean="0">
+                          <a:solidFill>
+                            <a:schemeClr val="bg1"/>
+                          </a:solidFill>
+                        </a:rPr>
+                        <a:t>a</a:t>
+                      </a:r>
+                      <a:endParaRPr lang="en-US" sz="1400" dirty="0">
+                        <a:solidFill>
+                          <a:schemeClr val="bg1"/>
+                        </a:solidFill>
+                      </a:endParaRPr>
+                    </a:p>
+                  </a:txBody>
+                  <a:tcPr>
+                    <a:lnT w="12700" cap="flat" cmpd="sng" algn="ctr">
+                      <a:solidFill>
+                        <a:schemeClr val="tx1"/>
+                      </a:solidFill>
+                      <a:prstDash val="solid"/>
+                      <a:round/>
+                      <a:headEnd type="none" w="med" len="med"/>
+                      <a:tailEnd type="none" w="med" len="med"/>
+                    </a:lnT>
+                    <a:lnB w="12700" cap="flat" cmpd="sng" algn="ctr">
+                      <a:solidFill>
+                        <a:schemeClr val="tx1"/>
+                      </a:solidFill>
+                      <a:prstDash val="solid"/>
+                      <a:round/>
+                      <a:headEnd type="none" w="med" len="med"/>
+                      <a:tailEnd type="none" w="med" len="med"/>
+                    </a:lnB>
+                    <a:solidFill>
+                      <a:schemeClr val="accent2">
+                        <a:lumMod val="75000"/>
+                      </a:schemeClr>
+                    </a:solidFill>
+                  </a:tcPr>
+                </a:tc>
+                <a:tc>
+                  <a:txBody>
+                    <a:bodyPr/>
+                    <a:lstStyle/>
+                    <a:p>
+                      <a:pPr algn="ctr"/>
+                      <a:r>
+                        <a:rPr lang="en-US" sz="1400" dirty="0" smtClean="0">
+                          <a:solidFill>
+                            <a:schemeClr val="bg1"/>
+                          </a:solidFill>
+                        </a:rPr>
+                        <a:t>b</a:t>
+                      </a:r>
+                      <a:endParaRPr lang="en-US" sz="1400" dirty="0">
+                        <a:solidFill>
+                          <a:schemeClr val="bg1"/>
+                        </a:solidFill>
+                      </a:endParaRPr>
+                    </a:p>
+                  </a:txBody>
+                  <a:tcPr>
+                    <a:lnT w="12700" cap="flat" cmpd="sng" algn="ctr">
+                      <a:solidFill>
+                        <a:schemeClr val="tx1"/>
+                      </a:solidFill>
+                      <a:prstDash val="solid"/>
+                      <a:round/>
+                      <a:headEnd type="none" w="med" len="med"/>
+                      <a:tailEnd type="none" w="med" len="med"/>
+                    </a:lnT>
+                    <a:lnB w="12700" cap="flat" cmpd="sng" algn="ctr">
+                      <a:solidFill>
+                        <a:schemeClr val="tx1"/>
+                      </a:solidFill>
+                      <a:prstDash val="solid"/>
+                      <a:round/>
+                      <a:headEnd type="none" w="med" len="med"/>
+                      <a:tailEnd type="none" w="med" len="med"/>
+                    </a:lnB>
+                    <a:solidFill>
+                      <a:schemeClr val="accent2">
+                        <a:lumMod val="75000"/>
+                      </a:schemeClr>
+                    </a:solidFill>
+                  </a:tcPr>
+                </a:tc>
+                <a:tc>
+                  <a:txBody>
+                    <a:bodyPr/>
+                    <a:lstStyle/>
+                    <a:p>
+                      <a:pPr algn="ctr"/>
+                      <a:r>
+                        <a:rPr lang="en-US" sz="1400" dirty="0" smtClean="0">
+                          <a:solidFill>
+                            <a:schemeClr val="bg1"/>
+                          </a:solidFill>
+                        </a:rPr>
+                        <a:t>c</a:t>
+                      </a:r>
+                      <a:endParaRPr lang="en-US" sz="1400" dirty="0">
+                        <a:solidFill>
+                          <a:schemeClr val="bg1"/>
+                        </a:solidFill>
+                      </a:endParaRPr>
+                    </a:p>
+                  </a:txBody>
+                  <a:tcPr>
+                    <a:lnT w="12700" cap="flat" cmpd="sng" algn="ctr">
+                      <a:solidFill>
+                        <a:schemeClr val="tx1"/>
+                      </a:solidFill>
+                      <a:prstDash val="solid"/>
+                      <a:round/>
+                      <a:headEnd type="none" w="med" len="med"/>
+                      <a:tailEnd type="none" w="med" len="med"/>
+                    </a:lnT>
+                    <a:lnB w="12700" cap="flat" cmpd="sng" algn="ctr">
+                      <a:solidFill>
+                        <a:schemeClr val="tx1"/>
+                      </a:solidFill>
+                      <a:prstDash val="solid"/>
+                      <a:round/>
+                      <a:headEnd type="none" w="med" len="med"/>
+                      <a:tailEnd type="none" w="med" len="med"/>
+                    </a:lnB>
+                    <a:solidFill>
+                      <a:schemeClr val="accent2">
+                        <a:lumMod val="75000"/>
+                      </a:schemeClr>
+                    </a:solidFill>
+                  </a:tcPr>
+                </a:tc>
+                <a:tc>
+                  <a:txBody>
+                    <a:bodyPr/>
+                    <a:lstStyle/>
+                    <a:p>
+                      <a:pPr algn="ctr"/>
+                      <a:r>
+                        <a:rPr lang="en-US" sz="1400" dirty="0" smtClean="0">
+                          <a:solidFill>
+                            <a:schemeClr val="bg1"/>
+                          </a:solidFill>
+                        </a:rPr>
+                        <a:t>*</a:t>
+                      </a:r>
+                      <a:endParaRPr lang="en-US" sz="1400" dirty="0">
+                        <a:solidFill>
+                          <a:schemeClr val="bg1"/>
+                        </a:solidFill>
+                      </a:endParaRPr>
+                    </a:p>
+                  </a:txBody>
+                  <a:tcPr>
+                    <a:lnT w="12700" cap="flat" cmpd="sng" algn="ctr">
+                      <a:solidFill>
+                        <a:schemeClr val="tx1"/>
+                      </a:solidFill>
+                      <a:prstDash val="solid"/>
+                      <a:round/>
+                      <a:headEnd type="none" w="med" len="med"/>
+                      <a:tailEnd type="none" w="med" len="med"/>
+                    </a:lnT>
+                    <a:lnB w="12700" cap="flat" cmpd="sng" algn="ctr">
+                      <a:solidFill>
+                        <a:schemeClr val="tx1"/>
+                      </a:solidFill>
+                      <a:prstDash val="solid"/>
+                      <a:round/>
+                      <a:headEnd type="none" w="med" len="med"/>
+                      <a:tailEnd type="none" w="med" len="med"/>
+                    </a:lnB>
+                    <a:solidFill>
+                      <a:schemeClr val="accent2">
+                        <a:lumMod val="75000"/>
+                      </a:schemeClr>
+                    </a:solidFill>
+                  </a:tcPr>
+                </a:tc>
+              </a:tr>
+              <a:tr h="352548">
+                <a:tc>
+                  <a:txBody>
+                    <a:bodyPr/>
+                    <a:lstStyle/>
+                    <a:p>
+                      <a:pPr algn="ctr"/>
+                      <a:r>
+                        <a:rPr lang="en-US" sz="1400" dirty="0" smtClean="0">
+                          <a:solidFill>
+                            <a:schemeClr val="bg1"/>
+                          </a:solidFill>
+                        </a:rPr>
+                        <a:t>*</a:t>
+                      </a:r>
+                      <a:endParaRPr lang="en-US" sz="1400" dirty="0">
+                        <a:solidFill>
+                          <a:schemeClr val="bg1"/>
+                        </a:solidFill>
+                      </a:endParaRPr>
+                    </a:p>
+                  </a:txBody>
+                  <a:tcPr>
+                    <a:lnT w="12700" cap="flat" cmpd="sng" algn="ctr">
+                      <a:solidFill>
+                        <a:schemeClr val="tx1"/>
+                      </a:solidFill>
+                      <a:prstDash val="solid"/>
+                      <a:round/>
+                      <a:headEnd type="none" w="med" len="med"/>
+                      <a:tailEnd type="none" w="med" len="med"/>
+                    </a:lnT>
+                    <a:solidFill>
+                      <a:schemeClr val="accent2">
+                        <a:lumMod val="75000"/>
+                      </a:schemeClr>
+                    </a:solidFill>
+                  </a:tcPr>
+                </a:tc>
+                <a:tc>
+                  <a:txBody>
+                    <a:bodyPr/>
+                    <a:lstStyle/>
+                    <a:p>
+                      <a:pPr algn="ctr"/>
+                      <a:r>
+                        <a:rPr lang="en-US" sz="1400" dirty="0" smtClean="0">
+                          <a:solidFill>
+                            <a:schemeClr val="bg1"/>
+                          </a:solidFill>
+                        </a:rPr>
+                        <a:t>a</a:t>
+                      </a:r>
+                      <a:endParaRPr lang="en-US" sz="1400" dirty="0">
+                        <a:solidFill>
+                          <a:schemeClr val="bg1"/>
+                        </a:solidFill>
+                      </a:endParaRPr>
+                    </a:p>
+                  </a:txBody>
+                  <a:tcPr>
+                    <a:lnT w="12700" cap="flat" cmpd="sng" algn="ctr">
+                      <a:solidFill>
+                        <a:schemeClr val="tx1"/>
+                      </a:solidFill>
+                      <a:prstDash val="solid"/>
+                      <a:round/>
+                      <a:headEnd type="none" w="med" len="med"/>
+                      <a:tailEnd type="none" w="med" len="med"/>
+                    </a:lnT>
+                    <a:solidFill>
+                      <a:schemeClr val="accent2">
+                        <a:lumMod val="75000"/>
+                      </a:schemeClr>
+                    </a:solidFill>
+                  </a:tcPr>
+                </a:tc>
+                <a:tc>
+                  <a:txBody>
+                    <a:bodyPr/>
+                    <a:lstStyle/>
+                    <a:p>
+                      <a:pPr algn="ctr"/>
+                      <a:r>
+                        <a:rPr lang="en-US" sz="1400" dirty="0" smtClean="0">
+                          <a:solidFill>
+                            <a:schemeClr val="bg1"/>
+                          </a:solidFill>
+                        </a:rPr>
+                        <a:t>c</a:t>
+                      </a:r>
+                      <a:endParaRPr lang="en-US" sz="1400" dirty="0">
+                        <a:solidFill>
+                          <a:schemeClr val="bg1"/>
+                        </a:solidFill>
+                      </a:endParaRPr>
+                    </a:p>
+                  </a:txBody>
+                  <a:tcPr>
+                    <a:lnT w="12700" cap="flat" cmpd="sng" algn="ctr">
+                      <a:solidFill>
+                        <a:schemeClr val="tx1"/>
+                      </a:solidFill>
+                      <a:prstDash val="solid"/>
+                      <a:round/>
+                      <a:headEnd type="none" w="med" len="med"/>
+                      <a:tailEnd type="none" w="med" len="med"/>
+                    </a:lnT>
+                    <a:solidFill>
+                      <a:schemeClr val="accent2">
+                        <a:lumMod val="75000"/>
+                      </a:schemeClr>
+                    </a:solidFill>
+                  </a:tcPr>
+                </a:tc>
+                <a:tc>
+                  <a:txBody>
+                    <a:bodyPr/>
+                    <a:lstStyle/>
+                    <a:p>
+                      <a:pPr algn="ctr"/>
+                      <a:r>
+                        <a:rPr lang="en-US" sz="1400" dirty="0" smtClean="0">
+                          <a:solidFill>
+                            <a:schemeClr val="bg1"/>
+                          </a:solidFill>
+                        </a:rPr>
+                        <a:t>*</a:t>
+                      </a:r>
+                      <a:endParaRPr lang="en-US" sz="1400" dirty="0">
+                        <a:solidFill>
+                          <a:schemeClr val="bg1"/>
+                        </a:solidFill>
+                      </a:endParaRPr>
+                    </a:p>
+                  </a:txBody>
+                  <a:tcPr>
+                    <a:lnT w="12700" cap="flat" cmpd="sng" algn="ctr">
+                      <a:solidFill>
+                        <a:schemeClr val="tx1"/>
+                      </a:solidFill>
+                      <a:prstDash val="solid"/>
+                      <a:round/>
+                      <a:headEnd type="none" w="med" len="med"/>
+                      <a:tailEnd type="none" w="med" len="med"/>
+                    </a:lnT>
+                    <a:solidFill>
+                      <a:schemeClr val="accent2">
+                        <a:lumMod val="75000"/>
+                      </a:schemeClr>
+                    </a:solidFill>
+                  </a:tcPr>
+                </a:tc>
+                <a:tc>
+                  <a:txBody>
+                    <a:bodyPr/>
+                    <a:lstStyle/>
+                    <a:p>
+                      <a:pPr algn="ctr"/>
+                      <a:r>
+                        <a:rPr lang="en-US" sz="1400" dirty="0" smtClean="0">
+                          <a:solidFill>
+                            <a:schemeClr val="bg1"/>
+                          </a:solidFill>
+                        </a:rPr>
+                        <a:t>*</a:t>
+                      </a:r>
+                      <a:endParaRPr lang="en-US" sz="1400" dirty="0">
+                        <a:solidFill>
+                          <a:schemeClr val="bg1"/>
+                        </a:solidFill>
+                      </a:endParaRPr>
+                    </a:p>
+                  </a:txBody>
+                  <a:tcPr>
+                    <a:lnT w="12700" cap="flat" cmpd="sng" algn="ctr">
+                      <a:solidFill>
+                        <a:schemeClr val="tx1"/>
+                      </a:solidFill>
+                      <a:prstDash val="solid"/>
+                      <a:round/>
+                      <a:headEnd type="none" w="med" len="med"/>
+                      <a:tailEnd type="none" w="med" len="med"/>
+                    </a:lnT>
+                    <a:solidFill>
+                      <a:schemeClr val="accent2">
+                        <a:lumMod val="75000"/>
+                      </a:schemeClr>
+                    </a:solidFill>
+                  </a:tcPr>
+                </a:tc>
+              </a:tr>
+            </a:tbl>
+          </a:graphicData>
+        </a:graphic>
+      </p:graphicFrame>
+      <p:sp>
+        <p:nvSpPr>
+          <p:cNvPr id="15" name="TextBox 14"/>
+          <p:cNvSpPr txBox="1"/>
+          <p:nvPr/>
+        </p:nvSpPr>
+        <p:spPr>
+          <a:xfrm>
+            <a:off x="715736" y="3581400"/>
+            <a:ext cx="2590800" cy="1200329"/>
+          </a:xfrm>
+          <a:prstGeom prst="rect">
+            <a:avLst/>
+          </a:prstGeom>
+          <a:noFill/>
+        </p:spPr>
+        <p:txBody>
+          <a:bodyPr wrap="square" rtlCol="0">
+            <a:spAutoFit/>
+          </a:bodyPr>
+          <a:lstStyle/>
+          <a:p>
+            <a:r>
+              <a:rPr lang="en-US" dirty="0" smtClean="0">
+                <a:solidFill>
+                  <a:schemeClr val="accent2">
+                    <a:lumMod val="75000"/>
+                  </a:schemeClr>
+                </a:solidFill>
+              </a:rPr>
+              <a:t>Now we “delete” any unused nodes from T1’s leftovers to build a series of deletions.</a:t>
+            </a:r>
+            <a:endParaRPr lang="en-US" dirty="0">
+              <a:solidFill>
+                <a:schemeClr val="accent2">
+                  <a:lumMod val="75000"/>
+                </a:schemeClr>
+              </a:solidFill>
+            </a:endParaRPr>
+          </a:p>
+        </p:txBody>
+      </p:sp>
+      <p:sp>
+        <p:nvSpPr>
+          <p:cNvPr id="16" name="TextBox 15"/>
+          <p:cNvSpPr txBox="1"/>
+          <p:nvPr/>
+        </p:nvSpPr>
+        <p:spPr>
+          <a:xfrm>
+            <a:off x="5257800" y="2895600"/>
+            <a:ext cx="2590800" cy="923330"/>
+          </a:xfrm>
+          <a:prstGeom prst="rect">
+            <a:avLst/>
+          </a:prstGeom>
+          <a:noFill/>
+        </p:spPr>
+        <p:txBody>
+          <a:bodyPr wrap="square" rtlCol="0">
+            <a:spAutoFit/>
+          </a:bodyPr>
+          <a:lstStyle/>
+          <a:p>
+            <a:r>
+              <a:rPr lang="en-US" dirty="0" smtClean="0">
+                <a:solidFill>
+                  <a:schemeClr val="accent2">
+                    <a:lumMod val="75000"/>
+                  </a:schemeClr>
+                </a:solidFill>
+              </a:rPr>
+              <a:t>The only change is to delete </a:t>
+            </a:r>
+            <a:r>
+              <a:rPr lang="en-US" i="1" dirty="0" smtClean="0">
+                <a:solidFill>
+                  <a:schemeClr val="accent2">
+                    <a:lumMod val="75000"/>
+                  </a:schemeClr>
+                </a:solidFill>
+              </a:rPr>
+              <a:t>c</a:t>
+            </a:r>
+            <a:r>
+              <a:rPr lang="en-US" dirty="0" smtClean="0">
+                <a:solidFill>
+                  <a:schemeClr val="accent2">
+                    <a:lumMod val="75000"/>
+                  </a:schemeClr>
+                </a:solidFill>
+              </a:rPr>
+              <a:t> from </a:t>
+            </a:r>
+            <a:r>
+              <a:rPr lang="en-US" i="1" dirty="0" smtClean="0">
+                <a:solidFill>
+                  <a:schemeClr val="accent2">
+                    <a:lumMod val="75000"/>
+                  </a:schemeClr>
+                </a:solidFill>
+              </a:rPr>
+              <a:t>a</a:t>
+            </a:r>
+            <a:r>
+              <a:rPr lang="en-US" dirty="0" smtClean="0">
+                <a:solidFill>
+                  <a:schemeClr val="accent2">
+                    <a:lumMod val="75000"/>
+                  </a:schemeClr>
+                </a:solidFill>
+              </a:rPr>
+              <a:t>, which yields the following info:</a:t>
+            </a:r>
+            <a:endParaRPr lang="en-US" dirty="0">
+              <a:solidFill>
+                <a:schemeClr val="accent2">
+                  <a:lumMod val="75000"/>
+                </a:schemeClr>
+              </a:solidFill>
+            </a:endParaRPr>
+          </a:p>
+        </p:txBody>
+      </p:sp>
+      <p:sp>
+        <p:nvSpPr>
+          <p:cNvPr id="17" name="TextBox 16"/>
+          <p:cNvSpPr txBox="1"/>
+          <p:nvPr/>
+        </p:nvSpPr>
+        <p:spPr>
+          <a:xfrm>
+            <a:off x="5638800" y="3834319"/>
+            <a:ext cx="2590800" cy="523220"/>
+          </a:xfrm>
+          <a:prstGeom prst="rect">
+            <a:avLst/>
+          </a:prstGeom>
+          <a:noFill/>
+        </p:spPr>
+        <p:txBody>
+          <a:bodyPr wrap="square" rtlCol="0">
+            <a:spAutoFit/>
+          </a:bodyPr>
+          <a:lstStyle/>
+          <a:p>
+            <a:r>
+              <a:rPr lang="en-US" sz="2800" dirty="0" smtClean="0">
+                <a:solidFill>
+                  <a:schemeClr val="accent2">
+                    <a:lumMod val="75000"/>
+                  </a:schemeClr>
+                </a:solidFill>
+              </a:rPr>
+              <a:t>(a, c, 3)</a:t>
+            </a:r>
+            <a:endParaRPr lang="en-US" sz="2800" dirty="0">
+              <a:solidFill>
+                <a:schemeClr val="accent2">
+                  <a:lumMod val="75000"/>
+                </a:schemeClr>
+              </a:solidFill>
+            </a:endParaRPr>
+          </a:p>
+        </p:txBody>
+      </p:sp>
+      <p:sp>
+        <p:nvSpPr>
+          <p:cNvPr id="18" name="TextBox 17"/>
+          <p:cNvSpPr txBox="1"/>
+          <p:nvPr/>
+        </p:nvSpPr>
+        <p:spPr>
+          <a:xfrm>
+            <a:off x="5334000" y="4419600"/>
+            <a:ext cx="2590800" cy="1200329"/>
+          </a:xfrm>
+          <a:prstGeom prst="rect">
+            <a:avLst/>
+          </a:prstGeom>
+          <a:noFill/>
+        </p:spPr>
+        <p:txBody>
+          <a:bodyPr wrap="square" rtlCol="0">
+            <a:spAutoFit/>
+          </a:bodyPr>
+          <a:lstStyle/>
+          <a:p>
+            <a:r>
+              <a:rPr lang="en-US" dirty="0" smtClean="0">
+                <a:solidFill>
+                  <a:schemeClr val="accent2">
+                    <a:lumMod val="75000"/>
+                  </a:schemeClr>
+                </a:solidFill>
+              </a:rPr>
+              <a:t>Because </a:t>
+            </a:r>
+            <a:r>
+              <a:rPr lang="en-US" i="1" dirty="0" smtClean="0">
+                <a:solidFill>
+                  <a:schemeClr val="accent2">
+                    <a:lumMod val="75000"/>
+                  </a:schemeClr>
+                </a:solidFill>
+              </a:rPr>
+              <a:t>c</a:t>
+            </a:r>
+            <a:r>
+              <a:rPr lang="en-US" dirty="0" smtClean="0">
+                <a:solidFill>
+                  <a:schemeClr val="accent2">
+                    <a:lumMod val="75000"/>
+                  </a:schemeClr>
+                </a:solidFill>
+              </a:rPr>
+              <a:t> was deleted from </a:t>
+            </a:r>
+            <a:r>
+              <a:rPr lang="en-US" i="1" dirty="0" smtClean="0">
+                <a:solidFill>
+                  <a:schemeClr val="accent2">
+                    <a:lumMod val="75000"/>
+                  </a:schemeClr>
+                </a:solidFill>
+              </a:rPr>
+              <a:t>a</a:t>
+            </a:r>
+            <a:r>
+              <a:rPr lang="en-US" dirty="0" smtClean="0">
+                <a:solidFill>
+                  <a:schemeClr val="accent2">
+                    <a:lumMod val="75000"/>
+                  </a:schemeClr>
+                </a:solidFill>
+              </a:rPr>
+              <a:t>, and it was the third child of </a:t>
+            </a:r>
+            <a:r>
+              <a:rPr lang="en-US" i="1" dirty="0" smtClean="0">
+                <a:solidFill>
+                  <a:schemeClr val="accent2">
+                    <a:lumMod val="75000"/>
+                  </a:schemeClr>
+                </a:solidFill>
+              </a:rPr>
+              <a:t>a</a:t>
+            </a:r>
+            <a:r>
+              <a:rPr lang="en-US" dirty="0" smtClean="0">
+                <a:solidFill>
+                  <a:schemeClr val="accent2">
+                    <a:lumMod val="75000"/>
+                  </a:schemeClr>
+                </a:solidFill>
+              </a:rPr>
+              <a:t> at the time.</a:t>
+            </a:r>
+            <a:endParaRPr lang="en-US" dirty="0">
+              <a:solidFill>
+                <a:schemeClr val="accent2">
+                  <a:lumMod val="75000"/>
+                </a:schemeClr>
+              </a:solidFill>
+            </a:endParaRPr>
+          </a:p>
+        </p:txBody>
+      </p:sp>
+    </p:spTree>
+    <p:extLst>
+      <p:ext uri="{BB962C8B-B14F-4D97-AF65-F5344CB8AC3E}">
+        <p14:creationId xmlns:p14="http://schemas.microsoft.com/office/powerpoint/2010/main" val="333478570"/>
+      </p:ext>
+    </p:extLst>
+  </p:cSld>
+  <p:clrMapOvr>
+    <a:masterClrMapping/>
+  </p:clrMapOvr>
+</p:sld>
+</file>
+
+<file path=ppt/slides/slide8.xml><?xml version="1.0" encoding="utf-8"?>
+<p:sld xmlns:a="http://schemas.openxmlformats.org/drawingml/2006/main" xmlns:r="http://schemas.openxmlformats.org/officeDocument/2006/relationships" xmlns:p="http://schemas.openxmlformats.org/presentationml/2006/main">
+  <p:cSld>
+    <p:spTree>
+      <p:nvGrpSpPr>
+        <p:cNvPr id="1" name=""/>
+        <p:cNvGrpSpPr/>
+        <p:nvPr/>
+      </p:nvGrpSpPr>
+      <p:grpSpPr>
+        <a:xfrm>
+          <a:off x="0" y="0"/>
+          <a:ext cx="0" cy="0"/>
+          <a:chOff x="0" y="0"/>
+          <a:chExt cx="0" cy="0"/>
+        </a:xfrm>
+      </p:grpSpPr>
+      <p:sp>
+        <p:nvSpPr>
+          <p:cNvPr id="5" name="TextBox 4"/>
+          <p:cNvSpPr txBox="1"/>
+          <p:nvPr/>
+        </p:nvSpPr>
+        <p:spPr>
+          <a:xfrm>
+            <a:off x="715736" y="3581400"/>
+            <a:ext cx="2590800" cy="1200329"/>
+          </a:xfrm>
+          <a:prstGeom prst="rect">
+            <a:avLst/>
+          </a:prstGeom>
+          <a:noFill/>
+        </p:spPr>
+        <p:txBody>
+          <a:bodyPr wrap="square" rtlCol="0">
+            <a:spAutoFit/>
+          </a:bodyPr>
+          <a:lstStyle/>
+          <a:p>
+            <a:r>
+              <a:rPr lang="en-US" dirty="0" smtClean="0">
+                <a:solidFill>
+                  <a:schemeClr val="tx2">
+                    <a:lumMod val="75000"/>
+                  </a:schemeClr>
+                </a:solidFill>
+              </a:rPr>
+              <a:t>Now we insert any unused nodes from T2’s leftovers to build a series of insertions.</a:t>
+            </a:r>
+            <a:endParaRPr lang="en-US" dirty="0">
+              <a:solidFill>
+                <a:schemeClr val="tx2">
+                  <a:lumMod val="75000"/>
+                </a:schemeClr>
+              </a:solidFill>
+            </a:endParaRPr>
+          </a:p>
+        </p:txBody>
+      </p:sp>
+      <p:sp>
+        <p:nvSpPr>
+          <p:cNvPr id="6" name="TextBox 5"/>
+          <p:cNvSpPr txBox="1"/>
+          <p:nvPr/>
+        </p:nvSpPr>
+        <p:spPr>
+          <a:xfrm>
+            <a:off x="5257800" y="2895600"/>
+            <a:ext cx="2590800" cy="923330"/>
+          </a:xfrm>
+          <a:prstGeom prst="rect">
+            <a:avLst/>
+          </a:prstGeom>
+          <a:noFill/>
+        </p:spPr>
+        <p:txBody>
+          <a:bodyPr wrap="square" rtlCol="0">
+            <a:spAutoFit/>
+          </a:bodyPr>
+          <a:lstStyle/>
+          <a:p>
+            <a:r>
+              <a:rPr lang="en-US" dirty="0" smtClean="0">
+                <a:solidFill>
+                  <a:schemeClr val="tx2">
+                    <a:lumMod val="75000"/>
+                  </a:schemeClr>
+                </a:solidFill>
+              </a:rPr>
+              <a:t>The only change is to insert </a:t>
+            </a:r>
+            <a:r>
+              <a:rPr lang="en-US" i="1" dirty="0" smtClean="0">
+                <a:solidFill>
+                  <a:schemeClr val="tx2">
+                    <a:lumMod val="75000"/>
+                  </a:schemeClr>
+                </a:solidFill>
+              </a:rPr>
+              <a:t>d</a:t>
+            </a:r>
+            <a:r>
+              <a:rPr lang="en-US" dirty="0" smtClean="0">
+                <a:solidFill>
+                  <a:schemeClr val="tx2">
+                    <a:lumMod val="75000"/>
+                  </a:schemeClr>
+                </a:solidFill>
+              </a:rPr>
+              <a:t> on </a:t>
+            </a:r>
+            <a:r>
+              <a:rPr lang="en-US" i="1" dirty="0" smtClean="0">
+                <a:solidFill>
+                  <a:schemeClr val="tx2">
+                    <a:lumMod val="75000"/>
+                  </a:schemeClr>
+                </a:solidFill>
+              </a:rPr>
+              <a:t>a</a:t>
+            </a:r>
+            <a:r>
+              <a:rPr lang="en-US" dirty="0" smtClean="0">
+                <a:solidFill>
+                  <a:schemeClr val="tx2">
+                    <a:lumMod val="75000"/>
+                  </a:schemeClr>
+                </a:solidFill>
+              </a:rPr>
+              <a:t>, which yields the following info:</a:t>
+            </a:r>
+            <a:endParaRPr lang="en-US" dirty="0">
+              <a:solidFill>
+                <a:schemeClr val="tx2">
+                  <a:lumMod val="75000"/>
+                </a:schemeClr>
+              </a:solidFill>
+            </a:endParaRPr>
+          </a:p>
+        </p:txBody>
+      </p:sp>
+      <p:sp>
+        <p:nvSpPr>
+          <p:cNvPr id="7" name="TextBox 6"/>
+          <p:cNvSpPr txBox="1"/>
+          <p:nvPr/>
+        </p:nvSpPr>
+        <p:spPr>
+          <a:xfrm>
+            <a:off x="5638800" y="3834319"/>
+            <a:ext cx="2590800" cy="523220"/>
+          </a:xfrm>
+          <a:prstGeom prst="rect">
+            <a:avLst/>
+          </a:prstGeom>
+          <a:noFill/>
+        </p:spPr>
+        <p:txBody>
+          <a:bodyPr wrap="square" rtlCol="0">
+            <a:spAutoFit/>
+          </a:bodyPr>
+          <a:lstStyle/>
+          <a:p>
+            <a:r>
+              <a:rPr lang="en-US" sz="2800" dirty="0" smtClean="0">
+                <a:solidFill>
+                  <a:schemeClr val="tx2">
+                    <a:lumMod val="75000"/>
+                  </a:schemeClr>
+                </a:solidFill>
+              </a:rPr>
+              <a:t>(a, d, 3)</a:t>
+            </a:r>
+            <a:endParaRPr lang="en-US" sz="2800" dirty="0">
+              <a:solidFill>
+                <a:schemeClr val="tx2">
+                  <a:lumMod val="75000"/>
+                </a:schemeClr>
+              </a:solidFill>
+            </a:endParaRPr>
+          </a:p>
+        </p:txBody>
+      </p:sp>
+      <p:sp>
+        <p:nvSpPr>
+          <p:cNvPr id="8" name="TextBox 7"/>
+          <p:cNvSpPr txBox="1"/>
+          <p:nvPr/>
+        </p:nvSpPr>
+        <p:spPr>
+          <a:xfrm>
+            <a:off x="5334000" y="4419600"/>
+            <a:ext cx="2590800" cy="1200329"/>
+          </a:xfrm>
+          <a:prstGeom prst="rect">
+            <a:avLst/>
+          </a:prstGeom>
+          <a:noFill/>
+        </p:spPr>
+        <p:txBody>
+          <a:bodyPr wrap="square" rtlCol="0">
+            <a:spAutoFit/>
+          </a:bodyPr>
+          <a:lstStyle/>
+          <a:p>
+            <a:r>
+              <a:rPr lang="en-US" dirty="0" smtClean="0">
+                <a:solidFill>
+                  <a:schemeClr val="tx2">
+                    <a:lumMod val="75000"/>
+                  </a:schemeClr>
+                </a:solidFill>
+              </a:rPr>
+              <a:t>Because </a:t>
+            </a:r>
+            <a:r>
+              <a:rPr lang="en-US" i="1" dirty="0">
+                <a:solidFill>
+                  <a:schemeClr val="tx2">
+                    <a:lumMod val="75000"/>
+                  </a:schemeClr>
+                </a:solidFill>
+              </a:rPr>
+              <a:t>d</a:t>
+            </a:r>
+            <a:r>
+              <a:rPr lang="en-US" dirty="0" smtClean="0">
+                <a:solidFill>
+                  <a:schemeClr val="tx2">
+                    <a:lumMod val="75000"/>
+                  </a:schemeClr>
+                </a:solidFill>
+              </a:rPr>
+              <a:t> was added on to </a:t>
+            </a:r>
+            <a:r>
+              <a:rPr lang="en-US" i="1" dirty="0" smtClean="0">
+                <a:solidFill>
+                  <a:schemeClr val="tx2">
+                    <a:lumMod val="75000"/>
+                  </a:schemeClr>
+                </a:solidFill>
+              </a:rPr>
+              <a:t>a</a:t>
+            </a:r>
+            <a:r>
+              <a:rPr lang="en-US" dirty="0" smtClean="0">
+                <a:solidFill>
+                  <a:schemeClr val="tx2">
+                    <a:lumMod val="75000"/>
+                  </a:schemeClr>
+                </a:solidFill>
+              </a:rPr>
+              <a:t>, and it was the third child of </a:t>
+            </a:r>
+            <a:r>
+              <a:rPr lang="en-US" i="1" dirty="0" smtClean="0">
+                <a:solidFill>
+                  <a:schemeClr val="tx2">
+                    <a:lumMod val="75000"/>
+                  </a:schemeClr>
+                </a:solidFill>
+              </a:rPr>
+              <a:t>a</a:t>
+            </a:r>
+            <a:r>
+              <a:rPr lang="en-US" dirty="0" smtClean="0">
+                <a:solidFill>
+                  <a:schemeClr val="tx2">
+                    <a:lumMod val="75000"/>
+                  </a:schemeClr>
+                </a:solidFill>
+              </a:rPr>
+              <a:t> at the time of insertion.</a:t>
+            </a:r>
+            <a:endParaRPr lang="en-US" dirty="0">
+              <a:solidFill>
+                <a:schemeClr val="tx2">
+                  <a:lumMod val="75000"/>
+                </a:schemeClr>
+              </a:solidFill>
+            </a:endParaRPr>
+          </a:p>
+        </p:txBody>
+      </p:sp>
+      <p:graphicFrame>
+        <p:nvGraphicFramePr>
+          <p:cNvPr id="9" name="Table 8"/>
+          <p:cNvGraphicFramePr>
+            <a:graphicFrameLocks noGrp="1"/>
+          </p:cNvGraphicFramePr>
+          <p:nvPr>
+            <p:extLst>
+              <p:ext uri="{D42A27DB-BD31-4B8C-83A1-F6EECF244321}">
+                <p14:modId xmlns:p14="http://schemas.microsoft.com/office/powerpoint/2010/main" val="2813763827"/>
+              </p:ext>
+            </p:extLst>
+          </p:nvPr>
+        </p:nvGraphicFramePr>
+        <p:xfrm>
+          <a:off x="3409950" y="3581400"/>
+          <a:ext cx="1543050" cy="1266948"/>
+        </p:xfrm>
+        <a:graphic>
+          <a:graphicData uri="http://schemas.openxmlformats.org/drawingml/2006/table">
+            <a:tbl>
+              <a:tblPr firstRow="1" bandRow="1">
+                <a:tableStyleId>{2D5ABB26-0587-4C30-8999-92F81FD0307C}</a:tableStyleId>
+              </a:tblPr>
+              <a:tblGrid>
+                <a:gridCol w="323850"/>
+                <a:gridCol w="304800"/>
+                <a:gridCol w="304800"/>
+                <a:gridCol w="304800"/>
+                <a:gridCol w="304800"/>
+              </a:tblGrid>
+              <a:tr h="294485">
+                <a:tc>
+                  <a:txBody>
+                    <a:bodyPr/>
+                    <a:lstStyle/>
+                    <a:p>
+                      <a:pPr algn="ctr"/>
+                      <a:r>
+                        <a:rPr lang="en-US" sz="1400" dirty="0" smtClean="0">
+                          <a:solidFill>
+                            <a:schemeClr val="bg1"/>
+                          </a:solidFill>
+                        </a:rPr>
+                        <a:t>*</a:t>
+                      </a:r>
+                      <a:endParaRPr lang="en-US" sz="1400" dirty="0">
+                        <a:solidFill>
+                          <a:schemeClr val="bg1"/>
+                        </a:solidFill>
+                      </a:endParaRPr>
+                    </a:p>
+                  </a:txBody>
+                  <a:tcPr>
+                    <a:lnT w="12700" cap="flat" cmpd="sng" algn="ctr">
+                      <a:solidFill>
+                        <a:schemeClr val="tx1"/>
+                      </a:solidFill>
+                      <a:prstDash val="solid"/>
+                      <a:round/>
+                      <a:headEnd type="none" w="med" len="med"/>
+                      <a:tailEnd type="none" w="med" len="med"/>
+                    </a:lnT>
+                    <a:lnB w="12700" cap="flat" cmpd="sng" algn="ctr">
+                      <a:solidFill>
+                        <a:schemeClr val="tx1"/>
+                      </a:solidFill>
+                      <a:prstDash val="solid"/>
+                      <a:round/>
+                      <a:headEnd type="none" w="med" len="med"/>
+                      <a:tailEnd type="none" w="med" len="med"/>
+                    </a:lnB>
+                    <a:solidFill>
+                      <a:schemeClr val="tx2">
+                        <a:lumMod val="75000"/>
+                      </a:schemeClr>
+                    </a:solidFill>
+                  </a:tcPr>
+                </a:tc>
+                <a:tc>
+                  <a:txBody>
+                    <a:bodyPr/>
+                    <a:lstStyle/>
+                    <a:p>
+                      <a:pPr algn="ctr"/>
+                      <a:r>
+                        <a:rPr lang="en-US" sz="1400" dirty="0" smtClean="0">
+                          <a:solidFill>
+                            <a:schemeClr val="bg1"/>
+                          </a:solidFill>
+                        </a:rPr>
+                        <a:t>a</a:t>
+                      </a:r>
+                      <a:endParaRPr lang="en-US" sz="1400" dirty="0">
+                        <a:solidFill>
+                          <a:schemeClr val="bg1"/>
+                        </a:solidFill>
+                      </a:endParaRPr>
+                    </a:p>
+                  </a:txBody>
+                  <a:tcPr>
+                    <a:lnT w="12700" cap="flat" cmpd="sng" algn="ctr">
+                      <a:solidFill>
+                        <a:schemeClr val="tx1"/>
+                      </a:solidFill>
+                      <a:prstDash val="solid"/>
+                      <a:round/>
+                      <a:headEnd type="none" w="med" len="med"/>
+                      <a:tailEnd type="none" w="med" len="med"/>
+                    </a:lnT>
+                    <a:lnB w="12700" cap="flat" cmpd="sng" algn="ctr">
+                      <a:solidFill>
+                        <a:schemeClr val="tx1"/>
+                      </a:solidFill>
+                      <a:prstDash val="solid"/>
+                      <a:round/>
+                      <a:headEnd type="none" w="med" len="med"/>
+                      <a:tailEnd type="none" w="med" len="med"/>
+                    </a:lnB>
+                    <a:solidFill>
+                      <a:schemeClr val="tx2">
+                        <a:lumMod val="75000"/>
+                      </a:schemeClr>
+                    </a:solidFill>
+                  </a:tcPr>
+                </a:tc>
+                <a:tc>
+                  <a:txBody>
+                    <a:bodyPr/>
+                    <a:lstStyle/>
+                    <a:p>
+                      <a:pPr algn="ctr"/>
+                      <a:r>
+                        <a:rPr lang="en-US" sz="1400" dirty="0" smtClean="0">
+                          <a:solidFill>
+                            <a:schemeClr val="bg1"/>
+                          </a:solidFill>
+                        </a:rPr>
+                        <a:t>a</a:t>
+                      </a:r>
+                      <a:endParaRPr lang="en-US" sz="1400" dirty="0">
+                        <a:solidFill>
+                          <a:schemeClr val="bg1"/>
+                        </a:solidFill>
+                      </a:endParaRPr>
+                    </a:p>
+                  </a:txBody>
+                  <a:tcPr>
+                    <a:lnT w="12700" cap="flat" cmpd="sng" algn="ctr">
+                      <a:solidFill>
+                        <a:schemeClr val="tx1"/>
+                      </a:solidFill>
+                      <a:prstDash val="solid"/>
+                      <a:round/>
+                      <a:headEnd type="none" w="med" len="med"/>
+                      <a:tailEnd type="none" w="med" len="med"/>
+                    </a:lnT>
+                    <a:lnB w="12700" cap="flat" cmpd="sng" algn="ctr">
+                      <a:solidFill>
+                        <a:schemeClr val="tx1"/>
+                      </a:solidFill>
+                      <a:prstDash val="solid"/>
+                      <a:round/>
+                      <a:headEnd type="none" w="med" len="med"/>
+                      <a:tailEnd type="none" w="med" len="med"/>
+                    </a:lnB>
+                    <a:solidFill>
+                      <a:schemeClr val="tx2">
+                        <a:lumMod val="75000"/>
+                      </a:schemeClr>
+                    </a:solidFill>
+                  </a:tcPr>
+                </a:tc>
+                <a:tc>
+                  <a:txBody>
+                    <a:bodyPr/>
+                    <a:lstStyle/>
+                    <a:p>
+                      <a:pPr algn="ctr"/>
+                      <a:r>
+                        <a:rPr lang="en-US" sz="1400" dirty="0" smtClean="0">
+                          <a:solidFill>
+                            <a:schemeClr val="bg1"/>
+                          </a:solidFill>
+                        </a:rPr>
+                        <a:t>b</a:t>
+                      </a:r>
+                      <a:endParaRPr lang="en-US" sz="1400" dirty="0">
+                        <a:solidFill>
+                          <a:schemeClr val="bg1"/>
+                        </a:solidFill>
+                      </a:endParaRPr>
+                    </a:p>
+                  </a:txBody>
+                  <a:tcPr>
+                    <a:lnT w="12700" cap="flat" cmpd="sng" algn="ctr">
+                      <a:solidFill>
+                        <a:schemeClr val="tx1"/>
+                      </a:solidFill>
+                      <a:prstDash val="solid"/>
+                      <a:round/>
+                      <a:headEnd type="none" w="med" len="med"/>
+                      <a:tailEnd type="none" w="med" len="med"/>
+                    </a:lnT>
+                    <a:lnB w="12700" cap="flat" cmpd="sng" algn="ctr">
+                      <a:solidFill>
+                        <a:schemeClr val="tx1"/>
+                      </a:solidFill>
+                      <a:prstDash val="solid"/>
+                      <a:round/>
+                      <a:headEnd type="none" w="med" len="med"/>
+                      <a:tailEnd type="none" w="med" len="med"/>
+                    </a:lnB>
+                    <a:solidFill>
+                      <a:schemeClr val="tx2">
+                        <a:lumMod val="75000"/>
+                      </a:schemeClr>
+                    </a:solidFill>
+                  </a:tcPr>
+                </a:tc>
+                <a:tc>
+                  <a:txBody>
+                    <a:bodyPr/>
+                    <a:lstStyle/>
+                    <a:p>
+                      <a:pPr algn="ctr"/>
+                      <a:r>
+                        <a:rPr lang="en-US" sz="1400" dirty="0" smtClean="0">
+                          <a:solidFill>
+                            <a:schemeClr val="bg1"/>
+                          </a:solidFill>
+                        </a:rPr>
+                        <a:t>d</a:t>
+                      </a:r>
+                      <a:endParaRPr lang="en-US" sz="1400" dirty="0">
+                        <a:solidFill>
+                          <a:schemeClr val="bg1"/>
+                        </a:solidFill>
+                      </a:endParaRPr>
+                    </a:p>
+                  </a:txBody>
+                  <a:tcPr>
+                    <a:lnT w="12700" cap="flat" cmpd="sng" algn="ctr">
+                      <a:solidFill>
+                        <a:schemeClr val="tx1"/>
+                      </a:solidFill>
+                      <a:prstDash val="solid"/>
+                      <a:round/>
+                      <a:headEnd type="none" w="med" len="med"/>
+                      <a:tailEnd type="none" w="med" len="med"/>
+                    </a:lnT>
+                    <a:lnB w="12700" cap="flat" cmpd="sng" algn="ctr">
+                      <a:solidFill>
+                        <a:schemeClr val="tx1"/>
+                      </a:solidFill>
+                      <a:prstDash val="solid"/>
+                      <a:round/>
+                      <a:headEnd type="none" w="med" len="med"/>
+                      <a:tailEnd type="none" w="med" len="med"/>
+                    </a:lnB>
+                    <a:solidFill>
+                      <a:schemeClr val="tx2">
+                        <a:lumMod val="75000"/>
+                      </a:schemeClr>
+                    </a:solidFill>
+                  </a:tcPr>
+                </a:tc>
+              </a:tr>
+              <a:tr h="294485">
+                <a:tc>
+                  <a:txBody>
+                    <a:bodyPr/>
+                    <a:lstStyle/>
+                    <a:p>
+                      <a:pPr algn="ctr"/>
+                      <a:r>
+                        <a:rPr lang="en-US" sz="1400" dirty="0" smtClean="0">
+                          <a:solidFill>
+                            <a:schemeClr val="bg1"/>
+                          </a:solidFill>
+                        </a:rPr>
+                        <a:t>a</a:t>
+                      </a:r>
+                      <a:endParaRPr lang="en-US" sz="1400" dirty="0">
+                        <a:solidFill>
+                          <a:schemeClr val="bg1"/>
+                        </a:solidFill>
+                      </a:endParaRPr>
+                    </a:p>
+                  </a:txBody>
+                  <a:tcPr>
+                    <a:lnT w="12700" cap="flat" cmpd="sng" algn="ctr">
+                      <a:solidFill>
+                        <a:schemeClr val="tx1"/>
+                      </a:solidFill>
+                      <a:prstDash val="solid"/>
+                      <a:round/>
+                      <a:headEnd type="none" w="med" len="med"/>
+                      <a:tailEnd type="none" w="med" len="med"/>
+                    </a:lnT>
+                    <a:lnB w="12700" cap="flat" cmpd="sng" algn="ctr">
+                      <a:solidFill>
+                        <a:schemeClr val="tx1"/>
+                      </a:solidFill>
+                      <a:prstDash val="solid"/>
+                      <a:round/>
+                      <a:headEnd type="none" w="med" len="med"/>
+                      <a:tailEnd type="none" w="med" len="med"/>
+                    </a:lnB>
+                    <a:solidFill>
+                      <a:schemeClr val="tx2">
+                        <a:lumMod val="75000"/>
+                      </a:schemeClr>
+                    </a:solidFill>
+                  </a:tcPr>
+                </a:tc>
+                <a:tc>
+                  <a:txBody>
+                    <a:bodyPr/>
+                    <a:lstStyle/>
+                    <a:p>
+                      <a:pPr algn="ctr"/>
+                      <a:r>
+                        <a:rPr lang="en-US" sz="1400" dirty="0" smtClean="0">
+                          <a:solidFill>
+                            <a:schemeClr val="bg1"/>
+                          </a:solidFill>
+                        </a:rPr>
+                        <a:t>d</a:t>
+                      </a:r>
+                      <a:endParaRPr lang="en-US" sz="1400" dirty="0">
+                        <a:solidFill>
+                          <a:schemeClr val="bg1"/>
+                        </a:solidFill>
+                      </a:endParaRPr>
+                    </a:p>
+                  </a:txBody>
+                  <a:tcPr>
+                    <a:lnT w="12700" cap="flat" cmpd="sng" algn="ctr">
+                      <a:solidFill>
+                        <a:schemeClr val="tx1"/>
+                      </a:solidFill>
+                      <a:prstDash val="solid"/>
+                      <a:round/>
+                      <a:headEnd type="none" w="med" len="med"/>
+                      <a:tailEnd type="none" w="med" len="med"/>
+                    </a:lnT>
+                    <a:lnB w="12700" cap="flat" cmpd="sng" algn="ctr">
+                      <a:solidFill>
+                        <a:schemeClr val="tx1"/>
+                      </a:solidFill>
+                      <a:prstDash val="solid"/>
+                      <a:round/>
+                      <a:headEnd type="none" w="med" len="med"/>
+                      <a:tailEnd type="none" w="med" len="med"/>
+                    </a:lnB>
+                    <a:solidFill>
+                      <a:schemeClr val="tx2">
+                        <a:lumMod val="75000"/>
+                      </a:schemeClr>
+                    </a:solidFill>
+                  </a:tcPr>
+                </a:tc>
+                <a:tc>
+                  <a:txBody>
+                    <a:bodyPr/>
+                    <a:lstStyle/>
+                    <a:p>
+                      <a:pPr algn="ctr"/>
+                      <a:r>
+                        <a:rPr lang="en-US" sz="1400" dirty="0" smtClean="0">
+                          <a:solidFill>
+                            <a:schemeClr val="bg1"/>
+                          </a:solidFill>
+                        </a:rPr>
+                        <a:t>*</a:t>
+                      </a:r>
+                      <a:endParaRPr lang="en-US" sz="1400" dirty="0">
+                        <a:solidFill>
+                          <a:schemeClr val="bg1"/>
+                        </a:solidFill>
+                      </a:endParaRPr>
+                    </a:p>
+                  </a:txBody>
+                  <a:tcPr>
+                    <a:lnT w="12700" cap="flat" cmpd="sng" algn="ctr">
+                      <a:solidFill>
+                        <a:schemeClr val="tx1"/>
+                      </a:solidFill>
+                      <a:prstDash val="solid"/>
+                      <a:round/>
+                      <a:headEnd type="none" w="med" len="med"/>
+                      <a:tailEnd type="none" w="med" len="med"/>
+                    </a:lnT>
+                    <a:lnB w="12700" cap="flat" cmpd="sng" algn="ctr">
+                      <a:solidFill>
+                        <a:schemeClr val="tx1"/>
+                      </a:solidFill>
+                      <a:prstDash val="solid"/>
+                      <a:round/>
+                      <a:headEnd type="none" w="med" len="med"/>
+                      <a:tailEnd type="none" w="med" len="med"/>
+                    </a:lnB>
+                    <a:solidFill>
+                      <a:schemeClr val="tx2">
+                        <a:lumMod val="75000"/>
+                      </a:schemeClr>
+                    </a:solidFill>
+                  </a:tcPr>
+                </a:tc>
+                <a:tc>
+                  <a:txBody>
+                    <a:bodyPr/>
+                    <a:lstStyle/>
+                    <a:p>
+                      <a:pPr algn="ctr"/>
+                      <a:r>
+                        <a:rPr lang="en-US" sz="1400" dirty="0" smtClean="0">
+                          <a:solidFill>
+                            <a:schemeClr val="bg1"/>
+                          </a:solidFill>
+                        </a:rPr>
+                        <a:t>*</a:t>
+                      </a:r>
+                      <a:endParaRPr lang="en-US" sz="1400" dirty="0">
+                        <a:solidFill>
+                          <a:schemeClr val="bg1"/>
+                        </a:solidFill>
+                      </a:endParaRPr>
+                    </a:p>
+                  </a:txBody>
+                  <a:tcPr>
+                    <a:lnT w="12700" cap="flat" cmpd="sng" algn="ctr">
+                      <a:solidFill>
+                        <a:schemeClr val="tx1"/>
+                      </a:solidFill>
+                      <a:prstDash val="solid"/>
+                      <a:round/>
+                      <a:headEnd type="none" w="med" len="med"/>
+                      <a:tailEnd type="none" w="med" len="med"/>
+                    </a:lnT>
+                    <a:lnB w="12700" cap="flat" cmpd="sng" algn="ctr">
+                      <a:solidFill>
+                        <a:schemeClr val="tx1"/>
+                      </a:solidFill>
+                      <a:prstDash val="solid"/>
+                      <a:round/>
+                      <a:headEnd type="none" w="med" len="med"/>
+                      <a:tailEnd type="none" w="med" len="med"/>
+                    </a:lnB>
+                    <a:solidFill>
+                      <a:schemeClr val="tx2">
+                        <a:lumMod val="75000"/>
+                      </a:schemeClr>
+                    </a:solidFill>
+                  </a:tcPr>
+                </a:tc>
+                <a:tc>
+                  <a:txBody>
+                    <a:bodyPr/>
+                    <a:lstStyle/>
+                    <a:p>
+                      <a:pPr algn="ctr"/>
+                      <a:r>
+                        <a:rPr lang="en-US" sz="1400" dirty="0" smtClean="0">
+                          <a:solidFill>
+                            <a:schemeClr val="bg1"/>
+                          </a:solidFill>
+                        </a:rPr>
+                        <a:t>*</a:t>
+                      </a:r>
+                      <a:endParaRPr lang="en-US" sz="1400" dirty="0">
+                        <a:solidFill>
+                          <a:schemeClr val="bg1"/>
+                        </a:solidFill>
+                      </a:endParaRPr>
+                    </a:p>
+                  </a:txBody>
+                  <a:tcPr>
+                    <a:lnT w="12700" cap="flat" cmpd="sng" algn="ctr">
+                      <a:solidFill>
+                        <a:schemeClr val="tx1"/>
+                      </a:solidFill>
+                      <a:prstDash val="solid"/>
+                      <a:round/>
+                      <a:headEnd type="none" w="med" len="med"/>
+                      <a:tailEnd type="none" w="med" len="med"/>
+                    </a:lnT>
+                    <a:lnB w="12700" cap="flat" cmpd="sng" algn="ctr">
+                      <a:solidFill>
+                        <a:schemeClr val="tx1"/>
+                      </a:solidFill>
+                      <a:prstDash val="solid"/>
+                      <a:round/>
+                      <a:headEnd type="none" w="med" len="med"/>
+                      <a:tailEnd type="none" w="med" len="med"/>
+                    </a:lnB>
+                    <a:solidFill>
+                      <a:schemeClr val="tx2">
+                        <a:lumMod val="75000"/>
+                      </a:schemeClr>
+                    </a:solidFill>
+                  </a:tcPr>
+                </a:tc>
+              </a:tr>
+              <a:tr h="294485">
+                <a:tc>
+                  <a:txBody>
+                    <a:bodyPr/>
+                    <a:lstStyle/>
+                    <a:p>
+                      <a:pPr algn="ctr"/>
+                      <a:r>
+                        <a:rPr lang="en-US" sz="1400" dirty="0" smtClean="0">
+                          <a:solidFill>
+                            <a:schemeClr val="bg1"/>
+                          </a:solidFill>
+                        </a:rPr>
+                        <a:t>*</a:t>
+                      </a:r>
+                      <a:endParaRPr lang="en-US" sz="1400" dirty="0">
+                        <a:solidFill>
+                          <a:schemeClr val="bg1"/>
+                        </a:solidFill>
+                      </a:endParaRPr>
+                    </a:p>
+                  </a:txBody>
+                  <a:tcPr>
+                    <a:lnT w="12700" cap="flat" cmpd="sng" algn="ctr">
+                      <a:solidFill>
+                        <a:schemeClr val="tx1"/>
+                      </a:solidFill>
+                      <a:prstDash val="solid"/>
+                      <a:round/>
+                      <a:headEnd type="none" w="med" len="med"/>
+                      <a:tailEnd type="none" w="med" len="med"/>
+                    </a:lnT>
+                    <a:lnB w="12700" cap="flat" cmpd="sng" algn="ctr">
+                      <a:solidFill>
+                        <a:schemeClr val="tx1"/>
+                      </a:solidFill>
+                      <a:prstDash val="solid"/>
+                      <a:round/>
+                      <a:headEnd type="none" w="med" len="med"/>
+                      <a:tailEnd type="none" w="med" len="med"/>
+                    </a:lnB>
+                    <a:solidFill>
+                      <a:schemeClr val="tx2">
+                        <a:lumMod val="75000"/>
+                      </a:schemeClr>
+                    </a:solidFill>
+                  </a:tcPr>
+                </a:tc>
+                <a:tc>
+                  <a:txBody>
+                    <a:bodyPr/>
+                    <a:lstStyle/>
+                    <a:p>
+                      <a:pPr algn="ctr"/>
+                      <a:r>
+                        <a:rPr lang="en-US" sz="1400" dirty="0" smtClean="0">
+                          <a:solidFill>
+                            <a:schemeClr val="bg1"/>
+                          </a:solidFill>
+                        </a:rPr>
+                        <a:t>a</a:t>
+                      </a:r>
+                      <a:endParaRPr lang="en-US" sz="1400" dirty="0">
+                        <a:solidFill>
+                          <a:schemeClr val="bg1"/>
+                        </a:solidFill>
+                      </a:endParaRPr>
+                    </a:p>
+                  </a:txBody>
+                  <a:tcPr>
+                    <a:lnT w="12700" cap="flat" cmpd="sng" algn="ctr">
+                      <a:solidFill>
+                        <a:schemeClr val="tx1"/>
+                      </a:solidFill>
+                      <a:prstDash val="solid"/>
+                      <a:round/>
+                      <a:headEnd type="none" w="med" len="med"/>
+                      <a:tailEnd type="none" w="med" len="med"/>
+                    </a:lnT>
+                    <a:lnB w="12700" cap="flat" cmpd="sng" algn="ctr">
+                      <a:solidFill>
+                        <a:schemeClr val="tx1"/>
+                      </a:solidFill>
+                      <a:prstDash val="solid"/>
+                      <a:round/>
+                      <a:headEnd type="none" w="med" len="med"/>
+                      <a:tailEnd type="none" w="med" len="med"/>
+                    </a:lnB>
+                    <a:solidFill>
+                      <a:schemeClr val="tx2">
+                        <a:lumMod val="75000"/>
+                      </a:schemeClr>
+                    </a:solidFill>
+                  </a:tcPr>
+                </a:tc>
+                <a:tc>
+                  <a:txBody>
+                    <a:bodyPr/>
+                    <a:lstStyle/>
+                    <a:p>
+                      <a:pPr algn="ctr"/>
+                      <a:r>
+                        <a:rPr lang="en-US" sz="1400" dirty="0" smtClean="0">
+                          <a:solidFill>
+                            <a:schemeClr val="bg1"/>
+                          </a:solidFill>
+                        </a:rPr>
+                        <a:t>b</a:t>
+                      </a:r>
+                      <a:endParaRPr lang="en-US" sz="1400" dirty="0">
+                        <a:solidFill>
+                          <a:schemeClr val="bg1"/>
+                        </a:solidFill>
+                      </a:endParaRPr>
+                    </a:p>
+                  </a:txBody>
+                  <a:tcPr>
+                    <a:lnT w="12700" cap="flat" cmpd="sng" algn="ctr">
+                      <a:solidFill>
+                        <a:schemeClr val="tx1"/>
+                      </a:solidFill>
+                      <a:prstDash val="solid"/>
+                      <a:round/>
+                      <a:headEnd type="none" w="med" len="med"/>
+                      <a:tailEnd type="none" w="med" len="med"/>
+                    </a:lnT>
+                    <a:lnB w="12700" cap="flat" cmpd="sng" algn="ctr">
+                      <a:solidFill>
+                        <a:schemeClr val="tx1"/>
+                      </a:solidFill>
+                      <a:prstDash val="solid"/>
+                      <a:round/>
+                      <a:headEnd type="none" w="med" len="med"/>
+                      <a:tailEnd type="none" w="med" len="med"/>
+                    </a:lnB>
+                    <a:solidFill>
+                      <a:schemeClr val="tx2">
+                        <a:lumMod val="75000"/>
+                      </a:schemeClr>
+                    </a:solidFill>
+                  </a:tcPr>
+                </a:tc>
+                <a:tc>
+                  <a:txBody>
+                    <a:bodyPr/>
+                    <a:lstStyle/>
+                    <a:p>
+                      <a:pPr algn="ctr"/>
+                      <a:r>
+                        <a:rPr lang="en-US" sz="1400" dirty="0" smtClean="0">
+                          <a:solidFill>
+                            <a:schemeClr val="bg1"/>
+                          </a:solidFill>
+                        </a:rPr>
+                        <a:t>d</a:t>
+                      </a:r>
+                      <a:endParaRPr lang="en-US" sz="1400" dirty="0">
+                        <a:solidFill>
+                          <a:schemeClr val="bg1"/>
+                        </a:solidFill>
+                      </a:endParaRPr>
+                    </a:p>
+                  </a:txBody>
+                  <a:tcPr>
+                    <a:lnT w="12700" cap="flat" cmpd="sng" algn="ctr">
+                      <a:solidFill>
+                        <a:schemeClr val="tx1"/>
+                      </a:solidFill>
+                      <a:prstDash val="solid"/>
+                      <a:round/>
+                      <a:headEnd type="none" w="med" len="med"/>
+                      <a:tailEnd type="none" w="med" len="med"/>
+                    </a:lnT>
+                    <a:lnB w="12700" cap="flat" cmpd="sng" algn="ctr">
+                      <a:solidFill>
+                        <a:schemeClr val="tx1"/>
+                      </a:solidFill>
+                      <a:prstDash val="solid"/>
+                      <a:round/>
+                      <a:headEnd type="none" w="med" len="med"/>
+                      <a:tailEnd type="none" w="med" len="med"/>
+                    </a:lnB>
+                    <a:solidFill>
+                      <a:schemeClr val="tx2">
+                        <a:lumMod val="75000"/>
+                      </a:schemeClr>
+                    </a:solidFill>
+                  </a:tcPr>
+                </a:tc>
+                <a:tc>
+                  <a:txBody>
+                    <a:bodyPr/>
+                    <a:lstStyle/>
+                    <a:p>
+                      <a:pPr algn="ctr"/>
+                      <a:r>
+                        <a:rPr lang="en-US" sz="1400" dirty="0" smtClean="0">
+                          <a:solidFill>
+                            <a:schemeClr val="bg1"/>
+                          </a:solidFill>
+                        </a:rPr>
+                        <a:t>*</a:t>
+                      </a:r>
+                      <a:endParaRPr lang="en-US" sz="1400" dirty="0">
+                        <a:solidFill>
+                          <a:schemeClr val="bg1"/>
+                        </a:solidFill>
+                      </a:endParaRPr>
+                    </a:p>
+                  </a:txBody>
+                  <a:tcPr>
+                    <a:lnT w="12700" cap="flat" cmpd="sng" algn="ctr">
+                      <a:solidFill>
+                        <a:schemeClr val="tx1"/>
+                      </a:solidFill>
+                      <a:prstDash val="solid"/>
+                      <a:round/>
+                      <a:headEnd type="none" w="med" len="med"/>
+                      <a:tailEnd type="none" w="med" len="med"/>
+                    </a:lnT>
+                    <a:lnB w="12700" cap="flat" cmpd="sng" algn="ctr">
+                      <a:solidFill>
+                        <a:schemeClr val="tx1"/>
+                      </a:solidFill>
+                      <a:prstDash val="solid"/>
+                      <a:round/>
+                      <a:headEnd type="none" w="med" len="med"/>
+                      <a:tailEnd type="none" w="med" len="med"/>
+                    </a:lnB>
+                    <a:solidFill>
+                      <a:schemeClr val="tx2">
+                        <a:lumMod val="75000"/>
+                      </a:schemeClr>
+                    </a:solidFill>
+                  </a:tcPr>
+                </a:tc>
+              </a:tr>
+              <a:tr h="352548">
+                <a:tc>
+                  <a:txBody>
+                    <a:bodyPr/>
+                    <a:lstStyle/>
+                    <a:p>
+                      <a:pPr algn="ctr"/>
+                      <a:r>
+                        <a:rPr lang="en-US" sz="1400" dirty="0" smtClean="0">
+                          <a:solidFill>
+                            <a:schemeClr val="bg1"/>
+                          </a:solidFill>
+                        </a:rPr>
+                        <a:t>*</a:t>
+                      </a:r>
+                      <a:endParaRPr lang="en-US" sz="1400" dirty="0">
+                        <a:solidFill>
+                          <a:schemeClr val="bg1"/>
+                        </a:solidFill>
+                      </a:endParaRPr>
+                    </a:p>
+                  </a:txBody>
+                  <a:tcPr>
+                    <a:lnT w="12700" cap="flat" cmpd="sng" algn="ctr">
+                      <a:solidFill>
+                        <a:schemeClr val="tx1"/>
+                      </a:solidFill>
+                      <a:prstDash val="solid"/>
+                      <a:round/>
+                      <a:headEnd type="none" w="med" len="med"/>
+                      <a:tailEnd type="none" w="med" len="med"/>
+                    </a:lnT>
+                    <a:solidFill>
+                      <a:schemeClr val="tx2">
+                        <a:lumMod val="75000"/>
+                      </a:schemeClr>
+                    </a:solidFill>
+                  </a:tcPr>
+                </a:tc>
+                <a:tc>
+                  <a:txBody>
+                    <a:bodyPr/>
+                    <a:lstStyle/>
+                    <a:p>
+                      <a:pPr algn="ctr"/>
+                      <a:r>
+                        <a:rPr lang="en-US" sz="1400" dirty="0" smtClean="0">
+                          <a:solidFill>
+                            <a:schemeClr val="bg1"/>
+                          </a:solidFill>
+                        </a:rPr>
+                        <a:t>a</a:t>
+                      </a:r>
+                      <a:endParaRPr lang="en-US" sz="1400" dirty="0">
+                        <a:solidFill>
+                          <a:schemeClr val="bg1"/>
+                        </a:solidFill>
+                      </a:endParaRPr>
+                    </a:p>
+                  </a:txBody>
+                  <a:tcPr>
+                    <a:lnT w="12700" cap="flat" cmpd="sng" algn="ctr">
+                      <a:solidFill>
+                        <a:schemeClr val="tx1"/>
+                      </a:solidFill>
+                      <a:prstDash val="solid"/>
+                      <a:round/>
+                      <a:headEnd type="none" w="med" len="med"/>
+                      <a:tailEnd type="none" w="med" len="med"/>
+                    </a:lnT>
+                    <a:solidFill>
+                      <a:schemeClr val="tx2">
+                        <a:lumMod val="75000"/>
+                      </a:schemeClr>
+                    </a:solidFill>
+                  </a:tcPr>
+                </a:tc>
+                <a:tc>
+                  <a:txBody>
+                    <a:bodyPr/>
+                    <a:lstStyle/>
+                    <a:p>
+                      <a:pPr algn="ctr"/>
+                      <a:r>
+                        <a:rPr lang="en-US" sz="1400" dirty="0" smtClean="0">
+                          <a:solidFill>
+                            <a:schemeClr val="bg1"/>
+                          </a:solidFill>
+                        </a:rPr>
+                        <a:t>d</a:t>
+                      </a:r>
+                      <a:endParaRPr lang="en-US" sz="1400" dirty="0">
+                        <a:solidFill>
+                          <a:schemeClr val="bg1"/>
+                        </a:solidFill>
+                      </a:endParaRPr>
+                    </a:p>
+                  </a:txBody>
+                  <a:tcPr>
+                    <a:lnT w="12700" cap="flat" cmpd="sng" algn="ctr">
+                      <a:solidFill>
+                        <a:schemeClr val="tx1"/>
+                      </a:solidFill>
+                      <a:prstDash val="solid"/>
+                      <a:round/>
+                      <a:headEnd type="none" w="med" len="med"/>
+                      <a:tailEnd type="none" w="med" len="med"/>
+                    </a:lnT>
+                    <a:solidFill>
+                      <a:schemeClr val="tx2">
+                        <a:lumMod val="75000"/>
+                      </a:schemeClr>
+                    </a:solidFill>
+                  </a:tcPr>
+                </a:tc>
+                <a:tc>
+                  <a:txBody>
+                    <a:bodyPr/>
+                    <a:lstStyle/>
+                    <a:p>
+                      <a:pPr algn="ctr"/>
+                      <a:r>
+                        <a:rPr lang="en-US" sz="1400" dirty="0" smtClean="0">
+                          <a:solidFill>
+                            <a:schemeClr val="bg1"/>
+                          </a:solidFill>
+                        </a:rPr>
+                        <a:t>*</a:t>
+                      </a:r>
+                      <a:endParaRPr lang="en-US" sz="1400" dirty="0">
+                        <a:solidFill>
+                          <a:schemeClr val="bg1"/>
+                        </a:solidFill>
+                      </a:endParaRPr>
+                    </a:p>
+                  </a:txBody>
+                  <a:tcPr>
+                    <a:lnT w="12700" cap="flat" cmpd="sng" algn="ctr">
+                      <a:solidFill>
+                        <a:schemeClr val="tx1"/>
+                      </a:solidFill>
+                      <a:prstDash val="solid"/>
+                      <a:round/>
+                      <a:headEnd type="none" w="med" len="med"/>
+                      <a:tailEnd type="none" w="med" len="med"/>
+                    </a:lnT>
+                    <a:solidFill>
+                      <a:schemeClr val="tx2">
+                        <a:lumMod val="75000"/>
+                      </a:schemeClr>
+                    </a:solidFill>
+                  </a:tcPr>
+                </a:tc>
+                <a:tc>
+                  <a:txBody>
+                    <a:bodyPr/>
+                    <a:lstStyle/>
+                    <a:p>
+                      <a:pPr algn="ctr"/>
+                      <a:r>
+                        <a:rPr lang="en-US" sz="1400" dirty="0" smtClean="0">
+                          <a:solidFill>
+                            <a:schemeClr val="bg1"/>
+                          </a:solidFill>
+                        </a:rPr>
+                        <a:t>*</a:t>
+                      </a:r>
+                      <a:endParaRPr lang="en-US" sz="1400" dirty="0">
+                        <a:solidFill>
+                          <a:schemeClr val="bg1"/>
+                        </a:solidFill>
+                      </a:endParaRPr>
+                    </a:p>
+                  </a:txBody>
+                  <a:tcPr>
+                    <a:lnT w="12700" cap="flat" cmpd="sng" algn="ctr">
+                      <a:solidFill>
+                        <a:schemeClr val="tx1"/>
+                      </a:solidFill>
+                      <a:prstDash val="solid"/>
+                      <a:round/>
+                      <a:headEnd type="none" w="med" len="med"/>
+                      <a:tailEnd type="none" w="med" len="med"/>
+                    </a:lnT>
+                    <a:solidFill>
+                      <a:schemeClr val="tx2">
+                        <a:lumMod val="75000"/>
+                      </a:schemeClr>
+                    </a:solidFill>
+                  </a:tcPr>
+                </a:tc>
+              </a:tr>
+            </a:tbl>
+          </a:graphicData>
+        </a:graphic>
+      </p:graphicFrame>
+    </p:spTree>
+    <p:extLst>
+      <p:ext uri="{BB962C8B-B14F-4D97-AF65-F5344CB8AC3E}">
+        <p14:creationId xmlns:p14="http://schemas.microsoft.com/office/powerpoint/2010/main" val="684175245"/>
+      </p:ext>
+    </p:extLst>
+  </p:cSld>
+  <p:clrMapOvr>
+    <a:masterClrMapping/>
+  </p:clrMapOvr>
+</p:sld>
+</file>
+
+<file path=ppt/slides/slide9.xml><?xml version="1.0" encoding="utf-8"?>
+<p:sld xmlns:a="http://schemas.openxmlformats.org/drawingml/2006/main" xmlns:r="http://schemas.openxmlformats.org/officeDocument/2006/relationships" xmlns:p="http://schemas.openxmlformats.org/presentationml/2006/main">
+  <p:cSld>
+    <p:spTree>
+      <p:nvGrpSpPr>
+        <p:cNvPr id="1" name=""/>
+        <p:cNvGrpSpPr/>
+        <p:nvPr/>
+      </p:nvGrpSpPr>
+      <p:grpSpPr>
+        <a:xfrm>
+          <a:off x="0" y="0"/>
+          <a:ext cx="0" cy="0"/>
+          <a:chOff x="0" y="0"/>
+          <a:chExt cx="0" cy="0"/>
+        </a:xfrm>
+      </p:grpSpPr>
+      <p:sp>
+        <p:nvSpPr>
+          <p:cNvPr id="4" name="TextBox 3"/>
+          <p:cNvSpPr txBox="1"/>
+          <p:nvPr/>
+        </p:nvSpPr>
+        <p:spPr>
+          <a:xfrm>
+            <a:off x="2207079" y="2524780"/>
+            <a:ext cx="1295400" cy="523220"/>
+          </a:xfrm>
+          <a:prstGeom prst="rect">
+            <a:avLst/>
+          </a:prstGeom>
+          <a:noFill/>
+        </p:spPr>
+        <p:txBody>
+          <a:bodyPr wrap="square" rtlCol="0">
+            <a:spAutoFit/>
+          </a:bodyPr>
+          <a:lstStyle/>
+          <a:p>
+            <a:r>
+              <a:rPr lang="en-US" sz="2800" dirty="0" smtClean="0">
+                <a:solidFill>
+                  <a:schemeClr val="accent2">
+                    <a:lumMod val="75000"/>
+                  </a:schemeClr>
+                </a:solidFill>
+              </a:rPr>
+              <a:t>(a, c, 3)</a:t>
+            </a:r>
+            <a:endParaRPr lang="en-US" sz="2800" dirty="0">
+              <a:solidFill>
+                <a:schemeClr val="accent2">
+                  <a:lumMod val="75000"/>
+                </a:schemeClr>
+              </a:solidFill>
+            </a:endParaRPr>
+          </a:p>
+        </p:txBody>
+      </p:sp>
+      <p:sp>
+        <p:nvSpPr>
+          <p:cNvPr id="5" name="TextBox 4"/>
+          <p:cNvSpPr txBox="1"/>
+          <p:nvPr/>
+        </p:nvSpPr>
+        <p:spPr>
+          <a:xfrm>
+            <a:off x="1975757" y="1931861"/>
+            <a:ext cx="1758043" cy="523220"/>
+          </a:xfrm>
+          <a:prstGeom prst="rect">
+            <a:avLst/>
+          </a:prstGeom>
+          <a:noFill/>
+        </p:spPr>
+        <p:txBody>
+          <a:bodyPr wrap="square" rtlCol="0">
+            <a:spAutoFit/>
+          </a:bodyPr>
+          <a:lstStyle/>
+          <a:p>
+            <a:r>
+              <a:rPr lang="en-US" sz="2800" dirty="0" smtClean="0">
+                <a:solidFill>
+                  <a:schemeClr val="accent2">
+                    <a:lumMod val="75000"/>
+                  </a:schemeClr>
+                </a:solidFill>
+              </a:rPr>
+              <a:t>Deletions:</a:t>
+            </a:r>
+            <a:endParaRPr lang="en-US" sz="2800" dirty="0">
+              <a:solidFill>
+                <a:schemeClr val="accent2">
+                  <a:lumMod val="75000"/>
+                </a:schemeClr>
+              </a:solidFill>
+            </a:endParaRPr>
+          </a:p>
+        </p:txBody>
+      </p:sp>
+      <p:sp>
+        <p:nvSpPr>
+          <p:cNvPr id="6" name="TextBox 5"/>
+          <p:cNvSpPr txBox="1"/>
+          <p:nvPr/>
+        </p:nvSpPr>
+        <p:spPr>
+          <a:xfrm>
+            <a:off x="5568043" y="2524780"/>
+            <a:ext cx="1371600" cy="523220"/>
+          </a:xfrm>
+          <a:prstGeom prst="rect">
+            <a:avLst/>
+          </a:prstGeom>
+          <a:noFill/>
+        </p:spPr>
+        <p:txBody>
+          <a:bodyPr wrap="square" rtlCol="0">
+            <a:spAutoFit/>
+          </a:bodyPr>
+          <a:lstStyle/>
+          <a:p>
+            <a:r>
+              <a:rPr lang="en-US" sz="2800" dirty="0" smtClean="0">
+                <a:solidFill>
+                  <a:schemeClr val="tx2">
+                    <a:lumMod val="75000"/>
+                  </a:schemeClr>
+                </a:solidFill>
+              </a:rPr>
+              <a:t>(a, d, 3)</a:t>
+            </a:r>
+            <a:endParaRPr lang="en-US" sz="2800" dirty="0">
+              <a:solidFill>
+                <a:schemeClr val="tx2">
+                  <a:lumMod val="75000"/>
+                </a:schemeClr>
+              </a:solidFill>
+            </a:endParaRPr>
+          </a:p>
+        </p:txBody>
+      </p:sp>
+      <p:sp>
+        <p:nvSpPr>
+          <p:cNvPr id="7" name="TextBox 6"/>
+          <p:cNvSpPr txBox="1"/>
+          <p:nvPr/>
+        </p:nvSpPr>
+        <p:spPr>
+          <a:xfrm>
+            <a:off x="5334000" y="1966534"/>
+            <a:ext cx="1758043" cy="523220"/>
+          </a:xfrm>
+          <a:prstGeom prst="rect">
+            <a:avLst/>
+          </a:prstGeom>
+          <a:noFill/>
+        </p:spPr>
+        <p:txBody>
+          <a:bodyPr wrap="square" rtlCol="0">
+            <a:spAutoFit/>
+          </a:bodyPr>
+          <a:lstStyle/>
+          <a:p>
+            <a:r>
+              <a:rPr lang="en-US" sz="2800" dirty="0" smtClean="0">
+                <a:solidFill>
+                  <a:schemeClr val="tx2">
+                    <a:lumMod val="75000"/>
+                  </a:schemeClr>
+                </a:solidFill>
+              </a:rPr>
+              <a:t>Insertions:</a:t>
+            </a:r>
+            <a:endParaRPr lang="en-US" sz="2800" dirty="0">
+              <a:solidFill>
+                <a:schemeClr val="tx2">
+                  <a:lumMod val="75000"/>
+                </a:schemeClr>
+              </a:solidFill>
+            </a:endParaRPr>
+          </a:p>
+        </p:txBody>
+      </p:sp>
+      <p:sp>
+        <p:nvSpPr>
+          <p:cNvPr id="8" name="TextBox 7"/>
+          <p:cNvSpPr txBox="1"/>
+          <p:nvPr/>
+        </p:nvSpPr>
+        <p:spPr>
+          <a:xfrm>
+            <a:off x="1447800" y="1258669"/>
+            <a:ext cx="6172200" cy="646331"/>
+          </a:xfrm>
+          <a:prstGeom prst="rect">
+            <a:avLst/>
+          </a:prstGeom>
+          <a:noFill/>
+        </p:spPr>
+        <p:txBody>
+          <a:bodyPr wrap="square" rtlCol="0">
+            <a:spAutoFit/>
+          </a:bodyPr>
+          <a:lstStyle/>
+          <a:p>
+            <a:r>
+              <a:rPr lang="en-US" dirty="0" smtClean="0">
+                <a:solidFill>
+                  <a:schemeClr val="tx2">
+                    <a:lumMod val="75000"/>
+                  </a:schemeClr>
+                </a:solidFill>
+              </a:rPr>
+              <a:t>Now we analyze the similarly positioned changes to try to find opportunities to rename instead of delete-then-insert</a:t>
+            </a:r>
+            <a:endParaRPr lang="en-US" dirty="0">
+              <a:solidFill>
+                <a:schemeClr val="tx2">
+                  <a:lumMod val="75000"/>
+                </a:schemeClr>
+              </a:solidFill>
+            </a:endParaRPr>
+          </a:p>
+        </p:txBody>
+      </p:sp>
+      <p:cxnSp>
+        <p:nvCxnSpPr>
+          <p:cNvPr id="18" name="Straight Arrow Connector 17"/>
+          <p:cNvCxnSpPr/>
+          <p:nvPr/>
+        </p:nvCxnSpPr>
+        <p:spPr>
+          <a:xfrm flipV="1">
+            <a:off x="2514600" y="2971800"/>
+            <a:ext cx="0" cy="533400"/>
+          </a:xfrm>
+          <a:prstGeom prst="straightConnector1">
+            <a:avLst/>
+          </a:prstGeom>
+          <a:ln w="28575">
+            <a:tailEnd type="arrow"/>
+          </a:ln>
+        </p:spPr>
+        <p:style>
+          <a:lnRef idx="1">
+            <a:schemeClr val="accent1"/>
+          </a:lnRef>
+          <a:fillRef idx="0">
+            <a:schemeClr val="accent1"/>
+          </a:fillRef>
+          <a:effectRef idx="0">
+            <a:schemeClr val="accent1"/>
+          </a:effectRef>
+          <a:fontRef idx="minor">
+            <a:schemeClr val="tx1"/>
+          </a:fontRef>
+        </p:style>
+      </p:cxnSp>
+      <p:cxnSp>
+        <p:nvCxnSpPr>
+          <p:cNvPr id="21" name="Straight Arrow Connector 20"/>
+          <p:cNvCxnSpPr/>
+          <p:nvPr/>
+        </p:nvCxnSpPr>
+        <p:spPr>
+          <a:xfrm flipV="1">
+            <a:off x="3200400" y="2971800"/>
+            <a:ext cx="0" cy="533400"/>
+          </a:xfrm>
+          <a:prstGeom prst="straightConnector1">
+            <a:avLst/>
+          </a:prstGeom>
+          <a:ln w="28575">
+            <a:tailEnd type="arrow"/>
+          </a:ln>
+        </p:spPr>
+        <p:style>
+          <a:lnRef idx="1">
+            <a:schemeClr val="accent1"/>
+          </a:lnRef>
+          <a:fillRef idx="0">
+            <a:schemeClr val="accent1"/>
+          </a:fillRef>
+          <a:effectRef idx="0">
+            <a:schemeClr val="accent1"/>
+          </a:effectRef>
+          <a:fontRef idx="minor">
+            <a:schemeClr val="tx1"/>
+          </a:fontRef>
+        </p:style>
+      </p:cxnSp>
+      <p:cxnSp>
+        <p:nvCxnSpPr>
+          <p:cNvPr id="22" name="Straight Arrow Connector 21"/>
+          <p:cNvCxnSpPr/>
+          <p:nvPr/>
+        </p:nvCxnSpPr>
+        <p:spPr>
+          <a:xfrm flipV="1">
+            <a:off x="5867400" y="2941864"/>
+            <a:ext cx="0" cy="533400"/>
+          </a:xfrm>
+          <a:prstGeom prst="straightConnector1">
+            <a:avLst/>
+          </a:prstGeom>
+          <a:ln w="28575">
+            <a:tailEnd type="arrow"/>
+          </a:ln>
+        </p:spPr>
+        <p:style>
+          <a:lnRef idx="1">
+            <a:schemeClr val="accent1"/>
+          </a:lnRef>
+          <a:fillRef idx="0">
+            <a:schemeClr val="accent1"/>
+          </a:fillRef>
+          <a:effectRef idx="0">
+            <a:schemeClr val="accent1"/>
+          </a:effectRef>
+          <a:fontRef idx="minor">
+            <a:schemeClr val="tx1"/>
+          </a:fontRef>
+        </p:style>
+      </p:cxnSp>
+      <p:cxnSp>
+        <p:nvCxnSpPr>
+          <p:cNvPr id="23" name="Straight Arrow Connector 22"/>
+          <p:cNvCxnSpPr/>
+          <p:nvPr/>
+        </p:nvCxnSpPr>
+        <p:spPr>
+          <a:xfrm flipV="1">
+            <a:off x="6553200" y="2941864"/>
+            <a:ext cx="0" cy="533400"/>
+          </a:xfrm>
+          <a:prstGeom prst="straightConnector1">
+            <a:avLst/>
+          </a:prstGeom>
+          <a:ln w="28575">
+            <a:tailEnd type="arrow"/>
+          </a:ln>
+        </p:spPr>
+        <p:style>
+          <a:lnRef idx="1">
+            <a:schemeClr val="accent1"/>
+          </a:lnRef>
+          <a:fillRef idx="0">
+            <a:schemeClr val="accent1"/>
+          </a:fillRef>
+          <a:effectRef idx="0">
+            <a:schemeClr val="accent1"/>
+          </a:effectRef>
+          <a:fontRef idx="minor">
+            <a:schemeClr val="tx1"/>
+          </a:fontRef>
+        </p:style>
+      </p:cxnSp>
+      <p:cxnSp>
+        <p:nvCxnSpPr>
+          <p:cNvPr id="25" name="Straight Connector 24"/>
+          <p:cNvCxnSpPr/>
+          <p:nvPr/>
+        </p:nvCxnSpPr>
+        <p:spPr>
+          <a:xfrm>
+            <a:off x="2514600" y="3505200"/>
+            <a:ext cx="685800" cy="0"/>
+          </a:xfrm>
+          <a:prstGeom prst="line">
+            <a:avLst/>
+          </a:prstGeom>
+          <a:ln w="28575"/>
+        </p:spPr>
+        <p:style>
+          <a:lnRef idx="1">
+            <a:schemeClr val="accent1"/>
+          </a:lnRef>
+          <a:fillRef idx="0">
+            <a:schemeClr val="accent1"/>
+          </a:fillRef>
+          <a:effectRef idx="0">
+            <a:schemeClr val="accent1"/>
+          </a:effectRef>
+          <a:fontRef idx="minor">
+            <a:schemeClr val="tx1"/>
+          </a:fontRef>
+        </p:style>
+      </p:cxnSp>
+      <p:cxnSp>
+        <p:nvCxnSpPr>
+          <p:cNvPr id="26" name="Straight Connector 25"/>
+          <p:cNvCxnSpPr/>
+          <p:nvPr/>
+        </p:nvCxnSpPr>
+        <p:spPr>
+          <a:xfrm>
+            <a:off x="5870121" y="3475264"/>
+            <a:ext cx="685800" cy="0"/>
+          </a:xfrm>
+          <a:prstGeom prst="line">
+            <a:avLst/>
+          </a:prstGeom>
+          <a:ln w="28575"/>
+        </p:spPr>
+        <p:style>
+          <a:lnRef idx="1">
+            <a:schemeClr val="accent1"/>
+          </a:lnRef>
+          <a:fillRef idx="0">
+            <a:schemeClr val="accent1"/>
+          </a:fillRef>
+          <a:effectRef idx="0">
+            <a:schemeClr val="accent1"/>
+          </a:effectRef>
+          <a:fontRef idx="minor">
+            <a:schemeClr val="tx1"/>
+          </a:fontRef>
+        </p:style>
+      </p:cxnSp>
+      <p:sp>
+        <p:nvSpPr>
+          <p:cNvPr id="27" name="TextBox 26"/>
+          <p:cNvSpPr txBox="1"/>
+          <p:nvPr/>
+        </p:nvSpPr>
+        <p:spPr>
+          <a:xfrm>
+            <a:off x="1752600" y="3733800"/>
+            <a:ext cx="5943600" cy="369332"/>
+          </a:xfrm>
+          <a:prstGeom prst="rect">
+            <a:avLst/>
+          </a:prstGeom>
+          <a:noFill/>
+        </p:spPr>
+        <p:txBody>
+          <a:bodyPr wrap="square" rtlCol="0">
+            <a:spAutoFit/>
+          </a:bodyPr>
+          <a:lstStyle/>
+          <a:p>
+            <a:r>
+              <a:rPr lang="en-US" dirty="0" smtClean="0">
+                <a:solidFill>
+                  <a:schemeClr val="tx2">
+                    <a:lumMod val="75000"/>
+                  </a:schemeClr>
+                </a:solidFill>
+              </a:rPr>
+              <a:t>We can rename </a:t>
+            </a:r>
+            <a:r>
+              <a:rPr lang="en-US" i="1" dirty="0" smtClean="0">
+                <a:solidFill>
+                  <a:schemeClr val="tx2">
+                    <a:lumMod val="75000"/>
+                  </a:schemeClr>
+                </a:solidFill>
+              </a:rPr>
+              <a:t>c</a:t>
+            </a:r>
+            <a:r>
+              <a:rPr lang="en-US" dirty="0" smtClean="0">
+                <a:solidFill>
+                  <a:schemeClr val="tx2">
+                    <a:lumMod val="75000"/>
+                  </a:schemeClr>
+                </a:solidFill>
+              </a:rPr>
+              <a:t> to </a:t>
+            </a:r>
+            <a:r>
+              <a:rPr lang="en-US" i="1" dirty="0" smtClean="0">
+                <a:solidFill>
+                  <a:schemeClr val="tx2">
+                    <a:lumMod val="75000"/>
+                  </a:schemeClr>
+                </a:solidFill>
+              </a:rPr>
+              <a:t>d</a:t>
+            </a:r>
+            <a:r>
+              <a:rPr lang="en-US" dirty="0" smtClean="0">
+                <a:solidFill>
+                  <a:schemeClr val="tx2">
+                    <a:lumMod val="75000"/>
+                  </a:schemeClr>
+                </a:solidFill>
+              </a:rPr>
+              <a:t> to cut the number of operations in half.</a:t>
+            </a:r>
+            <a:endParaRPr lang="en-US" dirty="0">
+              <a:solidFill>
+                <a:schemeClr val="tx2">
+                  <a:lumMod val="75000"/>
+                </a:schemeClr>
+              </a:solidFill>
+            </a:endParaRPr>
+          </a:p>
+        </p:txBody>
+      </p:sp>
+    </p:spTree>
+    <p:extLst>
+      <p:ext uri="{BB962C8B-B14F-4D97-AF65-F5344CB8AC3E}">
+        <p14:creationId xmlns:p14="http://schemas.microsoft.com/office/powerpoint/2010/main" val="940635280"/>
+      </p:ext>
+    </p:extLst>
+  </p:cSld>
+  <p:clrMapOvr>
+    <a:masterClrMapping/>
+  </p:clrMapOvr>
+</p:sld>
+</file>
+
 <file path=ppt/theme/theme1.xml><?xml version="1.0" encoding="utf-8"?>
 <a:theme xmlns:a="http://schemas.openxmlformats.org/drawingml/2006/main" name="Office Theme">
   <a:themeElements>

</xml_diff>